<commit_message>
Fixed library defintion errors
</commit_message>
<xml_diff>
--- a/Presentation Slides/Customer Retention Presentation.pptx
+++ b/Presentation Slides/Customer Retention Presentation.pptx
@@ -4,13 +4,16 @@
   <p:sldMasterIdLst>
     <p:sldMasterId id="2147483660" r:id="rId1"/>
   </p:sldMasterIdLst>
+  <p:notesMasterIdLst>
+    <p:notesMasterId r:id="rId9"/>
+  </p:notesMasterIdLst>
   <p:sldIdLst>
     <p:sldId id="259" r:id="rId2"/>
     <p:sldId id="263" r:id="rId3"/>
     <p:sldId id="256" r:id="rId4"/>
     <p:sldId id="257" r:id="rId5"/>
-    <p:sldId id="258" r:id="rId6"/>
-    <p:sldId id="260" r:id="rId7"/>
+    <p:sldId id="260" r:id="rId6"/>
+    <p:sldId id="258" r:id="rId7"/>
     <p:sldId id="261" r:id="rId8"/>
   </p:sldIdLst>
   <p:sldSz cx="9144000" cy="6858000" type="screen4x3"/>
@@ -128,6 +131,355 @@
     </p:extLst>
   </p:cmAuthor>
 </p:cmAuthorLst>
+</file>
+
+<file path=ppt/notesMasters/notesMaster1.xml><?xml version="1.0" encoding="utf-8"?>
+<p:notesMaster xmlns:a="http://schemas.openxmlformats.org/drawingml/2006/main" xmlns:r="http://schemas.openxmlformats.org/officeDocument/2006/relationships" xmlns:p="http://schemas.openxmlformats.org/presentationml/2006/main">
+  <p:cSld>
+    <p:bg>
+      <p:bgRef idx="1001">
+        <a:schemeClr val="bg1"/>
+      </p:bgRef>
+    </p:bg>
+    <p:spTree>
+      <p:nvGrpSpPr>
+        <p:cNvPr id="1" name=""/>
+        <p:cNvGrpSpPr/>
+        <p:nvPr/>
+      </p:nvGrpSpPr>
+      <p:grpSpPr>
+        <a:xfrm>
+          <a:off x="0" y="0"/>
+          <a:ext cx="0" cy="0"/>
+          <a:chOff x="0" y="0"/>
+          <a:chExt cx="0" cy="0"/>
+        </a:xfrm>
+      </p:grpSpPr>
+      <p:sp>
+        <p:nvSpPr>
+          <p:cNvPr id="2" name="Header Placeholder 1"/>
+          <p:cNvSpPr>
+            <a:spLocks noGrp="1"/>
+          </p:cNvSpPr>
+          <p:nvPr>
+            <p:ph type="hdr" sz="quarter"/>
+          </p:nvPr>
+        </p:nvSpPr>
+        <p:spPr>
+          <a:xfrm>
+            <a:off x="0" y="0"/>
+            <a:ext cx="2971800" cy="458788"/>
+          </a:xfrm>
+          <a:prstGeom prst="rect">
+            <a:avLst/>
+          </a:prstGeom>
+        </p:spPr>
+        <p:txBody>
+          <a:bodyPr vert="horz" lIns="91440" tIns="45720" rIns="91440" bIns="45720" rtlCol="0"/>
+          <a:lstStyle>
+            <a:lvl1pPr algn="l">
+              <a:defRPr sz="1200"/>
+            </a:lvl1pPr>
+          </a:lstStyle>
+          <a:p>
+            <a:endParaRPr lang="en-US"/>
+          </a:p>
+        </p:txBody>
+      </p:sp>
+      <p:sp>
+        <p:nvSpPr>
+          <p:cNvPr id="3" name="Date Placeholder 2"/>
+          <p:cNvSpPr>
+            <a:spLocks noGrp="1"/>
+          </p:cNvSpPr>
+          <p:nvPr>
+            <p:ph type="dt" idx="1"/>
+          </p:nvPr>
+        </p:nvSpPr>
+        <p:spPr>
+          <a:xfrm>
+            <a:off x="3884613" y="0"/>
+            <a:ext cx="2971800" cy="458788"/>
+          </a:xfrm>
+          <a:prstGeom prst="rect">
+            <a:avLst/>
+          </a:prstGeom>
+        </p:spPr>
+        <p:txBody>
+          <a:bodyPr vert="horz" lIns="91440" tIns="45720" rIns="91440" bIns="45720" rtlCol="0"/>
+          <a:lstStyle>
+            <a:lvl1pPr algn="r">
+              <a:defRPr sz="1200"/>
+            </a:lvl1pPr>
+          </a:lstStyle>
+          <a:p>
+            <a:fld id="{0C69C201-4C29-4D18-8B91-A62D227CE1C8}" type="datetimeFigureOut">
+              <a:rPr lang="en-US" smtClean="0"/>
+              <a:t>12/7/2020</a:t>
+            </a:fld>
+            <a:endParaRPr lang="en-US"/>
+          </a:p>
+        </p:txBody>
+      </p:sp>
+      <p:sp>
+        <p:nvSpPr>
+          <p:cNvPr id="4" name="Slide Image Placeholder 3"/>
+          <p:cNvSpPr>
+            <a:spLocks noGrp="1" noRot="1" noChangeAspect="1"/>
+          </p:cNvSpPr>
+          <p:nvPr>
+            <p:ph type="sldImg" idx="2"/>
+          </p:nvPr>
+        </p:nvSpPr>
+        <p:spPr>
+          <a:xfrm>
+            <a:off x="1371600" y="1143000"/>
+            <a:ext cx="4114800" cy="3086100"/>
+          </a:xfrm>
+          <a:prstGeom prst="rect">
+            <a:avLst/>
+          </a:prstGeom>
+          <a:noFill/>
+          <a:ln w="12700">
+            <a:solidFill>
+              <a:prstClr val="black"/>
+            </a:solidFill>
+          </a:ln>
+        </p:spPr>
+        <p:txBody>
+          <a:bodyPr vert="horz" lIns="91440" tIns="45720" rIns="91440" bIns="45720" rtlCol="0" anchor="ctr"/>
+          <a:lstStyle/>
+          <a:p>
+            <a:endParaRPr lang="en-US"/>
+          </a:p>
+        </p:txBody>
+      </p:sp>
+      <p:sp>
+        <p:nvSpPr>
+          <p:cNvPr id="5" name="Notes Placeholder 4"/>
+          <p:cNvSpPr>
+            <a:spLocks noGrp="1"/>
+          </p:cNvSpPr>
+          <p:nvPr>
+            <p:ph type="body" sz="quarter" idx="3"/>
+          </p:nvPr>
+        </p:nvSpPr>
+        <p:spPr>
+          <a:xfrm>
+            <a:off x="685800" y="4400550"/>
+            <a:ext cx="5486400" cy="3600450"/>
+          </a:xfrm>
+          <a:prstGeom prst="rect">
+            <a:avLst/>
+          </a:prstGeom>
+        </p:spPr>
+        <p:txBody>
+          <a:bodyPr vert="horz" lIns="91440" tIns="45720" rIns="91440" bIns="45720" rtlCol="0"/>
+          <a:lstStyle/>
+          <a:p>
+            <a:pPr lvl="0"/>
+            <a:r>
+              <a:rPr lang="en-US"/>
+              <a:t>Click to edit Master text styles</a:t>
+            </a:r>
+          </a:p>
+          <a:p>
+            <a:pPr lvl="1"/>
+            <a:r>
+              <a:rPr lang="en-US"/>
+              <a:t>Second level</a:t>
+            </a:r>
+          </a:p>
+          <a:p>
+            <a:pPr lvl="2"/>
+            <a:r>
+              <a:rPr lang="en-US"/>
+              <a:t>Third level</a:t>
+            </a:r>
+          </a:p>
+          <a:p>
+            <a:pPr lvl="3"/>
+            <a:r>
+              <a:rPr lang="en-US"/>
+              <a:t>Fourth level</a:t>
+            </a:r>
+          </a:p>
+          <a:p>
+            <a:pPr lvl="4"/>
+            <a:r>
+              <a:rPr lang="en-US"/>
+              <a:t>Fifth level</a:t>
+            </a:r>
+          </a:p>
+        </p:txBody>
+      </p:sp>
+      <p:sp>
+        <p:nvSpPr>
+          <p:cNvPr id="6" name="Footer Placeholder 5"/>
+          <p:cNvSpPr>
+            <a:spLocks noGrp="1"/>
+          </p:cNvSpPr>
+          <p:nvPr>
+            <p:ph type="ftr" sz="quarter" idx="4"/>
+          </p:nvPr>
+        </p:nvSpPr>
+        <p:spPr>
+          <a:xfrm>
+            <a:off x="0" y="8685213"/>
+            <a:ext cx="2971800" cy="458787"/>
+          </a:xfrm>
+          <a:prstGeom prst="rect">
+            <a:avLst/>
+          </a:prstGeom>
+        </p:spPr>
+        <p:txBody>
+          <a:bodyPr vert="horz" lIns="91440" tIns="45720" rIns="91440" bIns="45720" rtlCol="0" anchor="b"/>
+          <a:lstStyle>
+            <a:lvl1pPr algn="l">
+              <a:defRPr sz="1200"/>
+            </a:lvl1pPr>
+          </a:lstStyle>
+          <a:p>
+            <a:endParaRPr lang="en-US"/>
+          </a:p>
+        </p:txBody>
+      </p:sp>
+      <p:sp>
+        <p:nvSpPr>
+          <p:cNvPr id="7" name="Slide Number Placeholder 6"/>
+          <p:cNvSpPr>
+            <a:spLocks noGrp="1"/>
+          </p:cNvSpPr>
+          <p:nvPr>
+            <p:ph type="sldNum" sz="quarter" idx="5"/>
+          </p:nvPr>
+        </p:nvSpPr>
+        <p:spPr>
+          <a:xfrm>
+            <a:off x="3884613" y="8685213"/>
+            <a:ext cx="2971800" cy="458787"/>
+          </a:xfrm>
+          <a:prstGeom prst="rect">
+            <a:avLst/>
+          </a:prstGeom>
+        </p:spPr>
+        <p:txBody>
+          <a:bodyPr vert="horz" lIns="91440" tIns="45720" rIns="91440" bIns="45720" rtlCol="0" anchor="b"/>
+          <a:lstStyle>
+            <a:lvl1pPr algn="r">
+              <a:defRPr sz="1200"/>
+            </a:lvl1pPr>
+          </a:lstStyle>
+          <a:p>
+            <a:fld id="{7C6335F4-8B48-4D26-A336-E8F1FBB3468B}" type="slidenum">
+              <a:rPr lang="en-US" smtClean="0"/>
+              <a:t>‹#›</a:t>
+            </a:fld>
+            <a:endParaRPr lang="en-US"/>
+          </a:p>
+        </p:txBody>
+      </p:sp>
+    </p:spTree>
+    <p:extLst>
+      <p:ext uri="{BB962C8B-B14F-4D97-AF65-F5344CB8AC3E}">
+        <p14:creationId xmlns:p14="http://schemas.microsoft.com/office/powerpoint/2010/main" val="761456554"/>
+      </p:ext>
+    </p:extLst>
+  </p:cSld>
+  <p:clrMap bg1="lt1" tx1="dk1" bg2="lt2" tx2="dk2" accent1="accent1" accent2="accent2" accent3="accent3" accent4="accent4" accent5="accent5" accent6="accent6" hlink="hlink" folHlink="folHlink"/>
+  <p:notesStyle>
+    <a:lvl1pPr marL="0" algn="l" defTabSz="914400" rtl="0" eaLnBrk="1" latinLnBrk="0" hangingPunct="1">
+      <a:defRPr sz="1200" kern="1200">
+        <a:solidFill>
+          <a:schemeClr val="tx1"/>
+        </a:solidFill>
+        <a:latin typeface="+mn-lt"/>
+        <a:ea typeface="+mn-ea"/>
+        <a:cs typeface="+mn-cs"/>
+      </a:defRPr>
+    </a:lvl1pPr>
+    <a:lvl2pPr marL="457200" algn="l" defTabSz="914400" rtl="0" eaLnBrk="1" latinLnBrk="0" hangingPunct="1">
+      <a:defRPr sz="1200" kern="1200">
+        <a:solidFill>
+          <a:schemeClr val="tx1"/>
+        </a:solidFill>
+        <a:latin typeface="+mn-lt"/>
+        <a:ea typeface="+mn-ea"/>
+        <a:cs typeface="+mn-cs"/>
+      </a:defRPr>
+    </a:lvl2pPr>
+    <a:lvl3pPr marL="914400" algn="l" defTabSz="914400" rtl="0" eaLnBrk="1" latinLnBrk="0" hangingPunct="1">
+      <a:defRPr sz="1200" kern="1200">
+        <a:solidFill>
+          <a:schemeClr val="tx1"/>
+        </a:solidFill>
+        <a:latin typeface="+mn-lt"/>
+        <a:ea typeface="+mn-ea"/>
+        <a:cs typeface="+mn-cs"/>
+      </a:defRPr>
+    </a:lvl3pPr>
+    <a:lvl4pPr marL="1371600" algn="l" defTabSz="914400" rtl="0" eaLnBrk="1" latinLnBrk="0" hangingPunct="1">
+      <a:defRPr sz="1200" kern="1200">
+        <a:solidFill>
+          <a:schemeClr val="tx1"/>
+        </a:solidFill>
+        <a:latin typeface="+mn-lt"/>
+        <a:ea typeface="+mn-ea"/>
+        <a:cs typeface="+mn-cs"/>
+      </a:defRPr>
+    </a:lvl4pPr>
+    <a:lvl5pPr marL="1828800" algn="l" defTabSz="914400" rtl="0" eaLnBrk="1" latinLnBrk="0" hangingPunct="1">
+      <a:defRPr sz="1200" kern="1200">
+        <a:solidFill>
+          <a:schemeClr val="tx1"/>
+        </a:solidFill>
+        <a:latin typeface="+mn-lt"/>
+        <a:ea typeface="+mn-ea"/>
+        <a:cs typeface="+mn-cs"/>
+      </a:defRPr>
+    </a:lvl5pPr>
+    <a:lvl6pPr marL="2286000" algn="l" defTabSz="914400" rtl="0" eaLnBrk="1" latinLnBrk="0" hangingPunct="1">
+      <a:defRPr sz="1200" kern="1200">
+        <a:solidFill>
+          <a:schemeClr val="tx1"/>
+        </a:solidFill>
+        <a:latin typeface="+mn-lt"/>
+        <a:ea typeface="+mn-ea"/>
+        <a:cs typeface="+mn-cs"/>
+      </a:defRPr>
+    </a:lvl6pPr>
+    <a:lvl7pPr marL="2743200" algn="l" defTabSz="914400" rtl="0" eaLnBrk="1" latinLnBrk="0" hangingPunct="1">
+      <a:defRPr sz="1200" kern="1200">
+        <a:solidFill>
+          <a:schemeClr val="tx1"/>
+        </a:solidFill>
+        <a:latin typeface="+mn-lt"/>
+        <a:ea typeface="+mn-ea"/>
+        <a:cs typeface="+mn-cs"/>
+      </a:defRPr>
+    </a:lvl7pPr>
+    <a:lvl8pPr marL="3200400" algn="l" defTabSz="914400" rtl="0" eaLnBrk="1" latinLnBrk="0" hangingPunct="1">
+      <a:defRPr sz="1200" kern="1200">
+        <a:solidFill>
+          <a:schemeClr val="tx1"/>
+        </a:solidFill>
+        <a:latin typeface="+mn-lt"/>
+        <a:ea typeface="+mn-ea"/>
+        <a:cs typeface="+mn-cs"/>
+      </a:defRPr>
+    </a:lvl8pPr>
+    <a:lvl9pPr marL="3657600" algn="l" defTabSz="914400" rtl="0" eaLnBrk="1" latinLnBrk="0" hangingPunct="1">
+      <a:defRPr sz="1200" kern="1200">
+        <a:solidFill>
+          <a:schemeClr val="tx1"/>
+        </a:solidFill>
+        <a:latin typeface="+mn-lt"/>
+        <a:ea typeface="+mn-ea"/>
+        <a:cs typeface="+mn-cs"/>
+      </a:defRPr>
+    </a:lvl9pPr>
+  </p:notesStyle>
+</p:notesMaster>
 </file>
 
 <file path=ppt/slideLayouts/slideLayout1.xml><?xml version="1.0" encoding="utf-8"?>
@@ -3437,6 +3789,389 @@
           </a:p>
         </p:txBody>
       </p:sp>
+      <p:grpSp>
+        <p:nvGrpSpPr>
+          <p:cNvPr id="13" name="Group 12">
+            <a:extLst>
+              <a:ext uri="{FF2B5EF4-FFF2-40B4-BE49-F238E27FC236}">
+                <a16:creationId xmlns:a16="http://schemas.microsoft.com/office/drawing/2014/main" id="{61FFEF50-BC60-4D3F-B8FC-E531726C4C19}"/>
+              </a:ext>
+            </a:extLst>
+          </p:cNvPr>
+          <p:cNvGrpSpPr/>
+          <p:nvPr/>
+        </p:nvGrpSpPr>
+        <p:grpSpPr>
+          <a:xfrm>
+            <a:off x="338832" y="995776"/>
+            <a:ext cx="8416180" cy="2581923"/>
+            <a:chOff x="338832" y="3943165"/>
+            <a:chExt cx="8416180" cy="2581923"/>
+          </a:xfrm>
+        </p:grpSpPr>
+        <p:sp>
+          <p:nvSpPr>
+            <p:cNvPr id="2" name="Rectangle 1">
+              <a:extLst>
+                <a:ext uri="{FF2B5EF4-FFF2-40B4-BE49-F238E27FC236}">
+                  <a16:creationId xmlns:a16="http://schemas.microsoft.com/office/drawing/2014/main" id="{0176274D-6B96-4657-9430-7936184B6943}"/>
+                </a:ext>
+              </a:extLst>
+            </p:cNvPr>
+            <p:cNvSpPr/>
+            <p:nvPr/>
+          </p:nvSpPr>
+          <p:spPr>
+            <a:xfrm>
+              <a:off x="1017973" y="4953741"/>
+              <a:ext cx="3339483" cy="1571347"/>
+            </a:xfrm>
+            <a:prstGeom prst="rect">
+              <a:avLst/>
+            </a:prstGeom>
+            <a:solidFill>
+              <a:schemeClr val="tx2">
+                <a:lumMod val="50000"/>
+              </a:schemeClr>
+            </a:solidFill>
+            <a:ln>
+              <a:noFill/>
+            </a:ln>
+          </p:spPr>
+          <p:style>
+            <a:lnRef idx="2">
+              <a:schemeClr val="accent1">
+                <a:shade val="50000"/>
+              </a:schemeClr>
+            </a:lnRef>
+            <a:fillRef idx="1">
+              <a:schemeClr val="accent1"/>
+            </a:fillRef>
+            <a:effectRef idx="0">
+              <a:schemeClr val="accent1"/>
+            </a:effectRef>
+            <a:fontRef idx="minor">
+              <a:schemeClr val="lt1"/>
+            </a:fontRef>
+          </p:style>
+          <p:txBody>
+            <a:bodyPr rtlCol="0" anchor="ctr"/>
+            <a:lstStyle/>
+            <a:p>
+              <a:pPr algn="ctr"/>
+              <a:r>
+                <a:rPr lang="en-US" dirty="0"/>
+                <a:t>Project Background &amp; Information</a:t>
+              </a:r>
+            </a:p>
+          </p:txBody>
+        </p:sp>
+        <p:sp>
+          <p:nvSpPr>
+            <p:cNvPr id="9" name="Rectangle 8">
+              <a:extLst>
+                <a:ext uri="{FF2B5EF4-FFF2-40B4-BE49-F238E27FC236}">
+                  <a16:creationId xmlns:a16="http://schemas.microsoft.com/office/drawing/2014/main" id="{B8415FBC-6092-4FC4-A0CA-D99103936C27}"/>
+                </a:ext>
+              </a:extLst>
+            </p:cNvPr>
+            <p:cNvSpPr/>
+            <p:nvPr/>
+          </p:nvSpPr>
+          <p:spPr>
+            <a:xfrm>
+              <a:off x="5149049" y="4953741"/>
+              <a:ext cx="3339483" cy="1571347"/>
+            </a:xfrm>
+            <a:prstGeom prst="rect">
+              <a:avLst/>
+            </a:prstGeom>
+            <a:solidFill>
+              <a:schemeClr val="tx2">
+                <a:lumMod val="50000"/>
+              </a:schemeClr>
+            </a:solidFill>
+            <a:ln>
+              <a:noFill/>
+            </a:ln>
+          </p:spPr>
+          <p:style>
+            <a:lnRef idx="2">
+              <a:schemeClr val="accent1">
+                <a:shade val="50000"/>
+              </a:schemeClr>
+            </a:lnRef>
+            <a:fillRef idx="1">
+              <a:schemeClr val="accent1"/>
+            </a:fillRef>
+            <a:effectRef idx="0">
+              <a:schemeClr val="accent1"/>
+            </a:effectRef>
+            <a:fontRef idx="minor">
+              <a:schemeClr val="lt1"/>
+            </a:fontRef>
+          </p:style>
+          <p:txBody>
+            <a:bodyPr rtlCol="0" anchor="ctr"/>
+            <a:lstStyle/>
+            <a:p>
+              <a:pPr algn="ctr"/>
+              <a:r>
+                <a:rPr lang="en-US" dirty="0"/>
+                <a:t>Code Walkthrough</a:t>
+              </a:r>
+            </a:p>
+          </p:txBody>
+        </p:sp>
+        <p:sp>
+          <p:nvSpPr>
+            <p:cNvPr id="3" name="Oval 2">
+              <a:extLst>
+                <a:ext uri="{FF2B5EF4-FFF2-40B4-BE49-F238E27FC236}">
+                  <a16:creationId xmlns:a16="http://schemas.microsoft.com/office/drawing/2014/main" id="{4942055C-7E96-4FE3-BE33-6514319CF16D}"/>
+                </a:ext>
+              </a:extLst>
+            </p:cNvPr>
+            <p:cNvSpPr/>
+            <p:nvPr/>
+          </p:nvSpPr>
+          <p:spPr>
+            <a:xfrm>
+              <a:off x="759038" y="4705165"/>
+              <a:ext cx="640080" cy="639193"/>
+            </a:xfrm>
+            <a:prstGeom prst="ellipse">
+              <a:avLst/>
+            </a:prstGeom>
+            <a:solidFill>
+              <a:schemeClr val="bg1"/>
+            </a:solidFill>
+            <a:ln w="38100">
+              <a:solidFill>
+                <a:schemeClr val="tx2">
+                  <a:lumMod val="50000"/>
+                </a:schemeClr>
+              </a:solidFill>
+            </a:ln>
+          </p:spPr>
+          <p:style>
+            <a:lnRef idx="2">
+              <a:schemeClr val="accent1">
+                <a:shade val="50000"/>
+              </a:schemeClr>
+            </a:lnRef>
+            <a:fillRef idx="1">
+              <a:schemeClr val="accent1"/>
+            </a:fillRef>
+            <a:effectRef idx="0">
+              <a:schemeClr val="accent1"/>
+            </a:effectRef>
+            <a:fontRef idx="minor">
+              <a:schemeClr val="lt1"/>
+            </a:fontRef>
+          </p:style>
+          <p:txBody>
+            <a:bodyPr rtlCol="0" anchor="ctr"/>
+            <a:lstStyle/>
+            <a:p>
+              <a:pPr algn="ctr"/>
+              <a:r>
+                <a:rPr lang="sv-SE" sz="3600" dirty="0">
+                  <a:solidFill>
+                    <a:schemeClr val="tx1"/>
+                  </a:solidFill>
+                  <a:latin typeface="Bahnschrift" panose="020B0502040204020203" pitchFamily="34" charset="0"/>
+                </a:rPr>
+                <a:t>1</a:t>
+              </a:r>
+              <a:endParaRPr lang="en-US" sz="3600" dirty="0">
+                <a:solidFill>
+                  <a:schemeClr val="tx1"/>
+                </a:solidFill>
+                <a:latin typeface="Bahnschrift" panose="020B0502040204020203" pitchFamily="34" charset="0"/>
+              </a:endParaRPr>
+            </a:p>
+          </p:txBody>
+        </p:sp>
+        <p:sp>
+          <p:nvSpPr>
+            <p:cNvPr id="10" name="Oval 9">
+              <a:extLst>
+                <a:ext uri="{FF2B5EF4-FFF2-40B4-BE49-F238E27FC236}">
+                  <a16:creationId xmlns:a16="http://schemas.microsoft.com/office/drawing/2014/main" id="{5592D62C-A74C-43F5-AD5A-F7FE8D391BFE}"/>
+                </a:ext>
+              </a:extLst>
+            </p:cNvPr>
+            <p:cNvSpPr/>
+            <p:nvPr/>
+          </p:nvSpPr>
+          <p:spPr>
+            <a:xfrm>
+              <a:off x="4900473" y="4705165"/>
+              <a:ext cx="640080" cy="639193"/>
+            </a:xfrm>
+            <a:prstGeom prst="ellipse">
+              <a:avLst/>
+            </a:prstGeom>
+            <a:solidFill>
+              <a:schemeClr val="bg1"/>
+            </a:solidFill>
+            <a:ln w="38100">
+              <a:solidFill>
+                <a:schemeClr val="tx2">
+                  <a:lumMod val="50000"/>
+                </a:schemeClr>
+              </a:solidFill>
+            </a:ln>
+          </p:spPr>
+          <p:style>
+            <a:lnRef idx="2">
+              <a:schemeClr val="accent1">
+                <a:shade val="50000"/>
+              </a:schemeClr>
+            </a:lnRef>
+            <a:fillRef idx="1">
+              <a:schemeClr val="accent1"/>
+            </a:fillRef>
+            <a:effectRef idx="0">
+              <a:schemeClr val="accent1"/>
+            </a:effectRef>
+            <a:fontRef idx="minor">
+              <a:schemeClr val="lt1"/>
+            </a:fontRef>
+          </p:style>
+          <p:txBody>
+            <a:bodyPr rtlCol="0" anchor="ctr"/>
+            <a:lstStyle/>
+            <a:p>
+              <a:pPr algn="ctr"/>
+              <a:r>
+                <a:rPr lang="sv-SE" sz="3600" dirty="0">
+                  <a:solidFill>
+                    <a:schemeClr val="tx1"/>
+                  </a:solidFill>
+                  <a:latin typeface="Bahnschrift" panose="020B0502040204020203" pitchFamily="34" charset="0"/>
+                </a:rPr>
+                <a:t>2</a:t>
+              </a:r>
+              <a:endParaRPr lang="en-US" sz="3600" dirty="0">
+                <a:solidFill>
+                  <a:schemeClr val="tx1"/>
+                </a:solidFill>
+                <a:latin typeface="Bahnschrift" panose="020B0502040204020203" pitchFamily="34" charset="0"/>
+              </a:endParaRPr>
+            </a:p>
+          </p:txBody>
+        </p:sp>
+        <p:sp>
+          <p:nvSpPr>
+            <p:cNvPr id="11" name="Rectangle 10">
+              <a:extLst>
+                <a:ext uri="{FF2B5EF4-FFF2-40B4-BE49-F238E27FC236}">
+                  <a16:creationId xmlns:a16="http://schemas.microsoft.com/office/drawing/2014/main" id="{4D799659-8AE6-49DC-A30F-0B9B1CF9F90D}"/>
+                </a:ext>
+              </a:extLst>
+            </p:cNvPr>
+            <p:cNvSpPr/>
+            <p:nvPr/>
+          </p:nvSpPr>
+          <p:spPr>
+            <a:xfrm>
+              <a:off x="347710" y="3943165"/>
+              <a:ext cx="4810218" cy="544499"/>
+            </a:xfrm>
+            <a:prstGeom prst="rect">
+              <a:avLst/>
+            </a:prstGeom>
+            <a:noFill/>
+            <a:ln>
+              <a:noFill/>
+            </a:ln>
+          </p:spPr>
+          <p:style>
+            <a:lnRef idx="2">
+              <a:schemeClr val="accent1">
+                <a:shade val="50000"/>
+              </a:schemeClr>
+            </a:lnRef>
+            <a:fillRef idx="1">
+              <a:schemeClr val="accent1"/>
+            </a:fillRef>
+            <a:effectRef idx="0">
+              <a:schemeClr val="accent1"/>
+            </a:effectRef>
+            <a:fontRef idx="minor">
+              <a:schemeClr val="lt1"/>
+            </a:fontRef>
+          </p:style>
+          <p:txBody>
+            <a:bodyPr rtlCol="0" anchor="t"/>
+            <a:lstStyle/>
+            <a:p>
+              <a:r>
+                <a:rPr lang="en-US" sz="2400" b="1" dirty="0">
+                  <a:solidFill>
+                    <a:schemeClr val="tx1"/>
+                  </a:solidFill>
+                  <a:latin typeface="Bahnschrift" panose="020B0502040204020203" pitchFamily="34" charset="0"/>
+                </a:rPr>
+                <a:t>Agenda</a:t>
+              </a:r>
+            </a:p>
+            <a:p>
+              <a:endParaRPr lang="en-US" sz="2400" b="1" dirty="0">
+                <a:solidFill>
+                  <a:schemeClr val="tx1"/>
+                </a:solidFill>
+                <a:latin typeface="Bahnschrift" panose="020B0502040204020203" pitchFamily="34" charset="0"/>
+              </a:endParaRPr>
+            </a:p>
+          </p:txBody>
+        </p:sp>
+        <p:cxnSp>
+          <p:nvCxnSpPr>
+            <p:cNvPr id="12" name="Straight Connector 11">
+              <a:extLst>
+                <a:ext uri="{FF2B5EF4-FFF2-40B4-BE49-F238E27FC236}">
+                  <a16:creationId xmlns:a16="http://schemas.microsoft.com/office/drawing/2014/main" id="{1A0D831C-30DA-47B1-80F0-2F2389582AAB}"/>
+                </a:ext>
+              </a:extLst>
+            </p:cNvPr>
+            <p:cNvCxnSpPr>
+              <a:cxnSpLocks/>
+            </p:cNvCxnSpPr>
+            <p:nvPr/>
+          </p:nvCxnSpPr>
+          <p:spPr>
+            <a:xfrm>
+              <a:off x="338832" y="4462032"/>
+              <a:ext cx="8416180" cy="0"/>
+            </a:xfrm>
+            <a:prstGeom prst="line">
+              <a:avLst/>
+            </a:prstGeom>
+            <a:ln w="28575">
+              <a:solidFill>
+                <a:schemeClr val="tx1"/>
+              </a:solidFill>
+            </a:ln>
+          </p:spPr>
+          <p:style>
+            <a:lnRef idx="1">
+              <a:schemeClr val="accent1"/>
+            </a:lnRef>
+            <a:fillRef idx="0">
+              <a:schemeClr val="accent1"/>
+            </a:fillRef>
+            <a:effectRef idx="0">
+              <a:schemeClr val="accent1"/>
+            </a:effectRef>
+            <a:fontRef idx="minor">
+              <a:schemeClr val="tx1"/>
+            </a:fontRef>
+          </p:style>
+        </p:cxnSp>
+      </p:grpSp>
       <p:sp>
         <p:nvSpPr>
           <p:cNvPr id="6" name="Rectangle 5">
@@ -3451,7 +4186,7 @@
         </p:nvSpPr>
         <p:spPr>
           <a:xfrm>
-            <a:off x="347710" y="991336"/>
+            <a:off x="347710" y="3841076"/>
             <a:ext cx="4810218" cy="544499"/>
           </a:xfrm>
           <a:prstGeom prst="rect">
@@ -3516,7 +4251,7 @@
         </p:nvSpPr>
         <p:spPr>
           <a:xfrm>
-            <a:off x="338832" y="1642371"/>
+            <a:off x="338832" y="4536500"/>
             <a:ext cx="8467817" cy="2317072"/>
           </a:xfrm>
           <a:prstGeom prst="rect">
@@ -3711,368 +4446,6 @@
           </a:p>
         </p:txBody>
       </p:sp>
-      <p:sp>
-        <p:nvSpPr>
-          <p:cNvPr id="2" name="Rectangle 1">
-            <a:extLst>
-              <a:ext uri="{FF2B5EF4-FFF2-40B4-BE49-F238E27FC236}">
-                <a16:creationId xmlns:a16="http://schemas.microsoft.com/office/drawing/2014/main" id="{0176274D-6B96-4657-9430-7936184B6943}"/>
-              </a:ext>
-            </a:extLst>
-          </p:cNvPr>
-          <p:cNvSpPr/>
-          <p:nvPr/>
-        </p:nvSpPr>
-        <p:spPr>
-          <a:xfrm>
-            <a:off x="1017973" y="4953741"/>
-            <a:ext cx="3339483" cy="1571347"/>
-          </a:xfrm>
-          <a:prstGeom prst="rect">
-            <a:avLst/>
-          </a:prstGeom>
-          <a:solidFill>
-            <a:schemeClr val="tx2">
-              <a:lumMod val="50000"/>
-            </a:schemeClr>
-          </a:solidFill>
-          <a:ln>
-            <a:noFill/>
-          </a:ln>
-        </p:spPr>
-        <p:style>
-          <a:lnRef idx="2">
-            <a:schemeClr val="accent1">
-              <a:shade val="50000"/>
-            </a:schemeClr>
-          </a:lnRef>
-          <a:fillRef idx="1">
-            <a:schemeClr val="accent1"/>
-          </a:fillRef>
-          <a:effectRef idx="0">
-            <a:schemeClr val="accent1"/>
-          </a:effectRef>
-          <a:fontRef idx="minor">
-            <a:schemeClr val="lt1"/>
-          </a:fontRef>
-        </p:style>
-        <p:txBody>
-          <a:bodyPr rtlCol="0" anchor="ctr"/>
-          <a:lstStyle/>
-          <a:p>
-            <a:pPr algn="ctr"/>
-            <a:r>
-              <a:rPr lang="en-US" dirty="0"/>
-              <a:t>Project Background &amp; Information</a:t>
-            </a:r>
-          </a:p>
-        </p:txBody>
-      </p:sp>
-      <p:sp>
-        <p:nvSpPr>
-          <p:cNvPr id="9" name="Rectangle 8">
-            <a:extLst>
-              <a:ext uri="{FF2B5EF4-FFF2-40B4-BE49-F238E27FC236}">
-                <a16:creationId xmlns:a16="http://schemas.microsoft.com/office/drawing/2014/main" id="{B8415FBC-6092-4FC4-A0CA-D99103936C27}"/>
-              </a:ext>
-            </a:extLst>
-          </p:cNvPr>
-          <p:cNvSpPr/>
-          <p:nvPr/>
-        </p:nvSpPr>
-        <p:spPr>
-          <a:xfrm>
-            <a:off x="5149049" y="4953741"/>
-            <a:ext cx="3339483" cy="1571347"/>
-          </a:xfrm>
-          <a:prstGeom prst="rect">
-            <a:avLst/>
-          </a:prstGeom>
-          <a:solidFill>
-            <a:schemeClr val="tx2">
-              <a:lumMod val="50000"/>
-            </a:schemeClr>
-          </a:solidFill>
-          <a:ln>
-            <a:noFill/>
-          </a:ln>
-        </p:spPr>
-        <p:style>
-          <a:lnRef idx="2">
-            <a:schemeClr val="accent1">
-              <a:shade val="50000"/>
-            </a:schemeClr>
-          </a:lnRef>
-          <a:fillRef idx="1">
-            <a:schemeClr val="accent1"/>
-          </a:fillRef>
-          <a:effectRef idx="0">
-            <a:schemeClr val="accent1"/>
-          </a:effectRef>
-          <a:fontRef idx="minor">
-            <a:schemeClr val="lt1"/>
-          </a:fontRef>
-        </p:style>
-        <p:txBody>
-          <a:bodyPr rtlCol="0" anchor="ctr"/>
-          <a:lstStyle/>
-          <a:p>
-            <a:pPr algn="ctr"/>
-            <a:r>
-              <a:rPr lang="en-US" dirty="0"/>
-              <a:t>Code Walkthrough</a:t>
-            </a:r>
-          </a:p>
-        </p:txBody>
-      </p:sp>
-      <p:sp>
-        <p:nvSpPr>
-          <p:cNvPr id="3" name="Oval 2">
-            <a:extLst>
-              <a:ext uri="{FF2B5EF4-FFF2-40B4-BE49-F238E27FC236}">
-                <a16:creationId xmlns:a16="http://schemas.microsoft.com/office/drawing/2014/main" id="{4942055C-7E96-4FE3-BE33-6514319CF16D}"/>
-              </a:ext>
-            </a:extLst>
-          </p:cNvPr>
-          <p:cNvSpPr/>
-          <p:nvPr/>
-        </p:nvSpPr>
-        <p:spPr>
-          <a:xfrm>
-            <a:off x="759038" y="4705165"/>
-            <a:ext cx="640080" cy="639193"/>
-          </a:xfrm>
-          <a:prstGeom prst="ellipse">
-            <a:avLst/>
-          </a:prstGeom>
-          <a:solidFill>
-            <a:schemeClr val="bg1"/>
-          </a:solidFill>
-          <a:ln w="38100">
-            <a:solidFill>
-              <a:schemeClr val="tx2">
-                <a:lumMod val="50000"/>
-              </a:schemeClr>
-            </a:solidFill>
-          </a:ln>
-        </p:spPr>
-        <p:style>
-          <a:lnRef idx="2">
-            <a:schemeClr val="accent1">
-              <a:shade val="50000"/>
-            </a:schemeClr>
-          </a:lnRef>
-          <a:fillRef idx="1">
-            <a:schemeClr val="accent1"/>
-          </a:fillRef>
-          <a:effectRef idx="0">
-            <a:schemeClr val="accent1"/>
-          </a:effectRef>
-          <a:fontRef idx="minor">
-            <a:schemeClr val="lt1"/>
-          </a:fontRef>
-        </p:style>
-        <p:txBody>
-          <a:bodyPr rtlCol="0" anchor="ctr"/>
-          <a:lstStyle/>
-          <a:p>
-            <a:pPr algn="ctr"/>
-            <a:r>
-              <a:rPr lang="sv-SE" sz="3600" dirty="0">
-                <a:solidFill>
-                  <a:schemeClr val="tx1"/>
-                </a:solidFill>
-                <a:latin typeface="Bahnschrift" panose="020B0502040204020203" pitchFamily="34" charset="0"/>
-              </a:rPr>
-              <a:t>1</a:t>
-            </a:r>
-            <a:endParaRPr lang="en-US" sz="3600" dirty="0">
-              <a:solidFill>
-                <a:schemeClr val="tx1"/>
-              </a:solidFill>
-              <a:latin typeface="Bahnschrift" panose="020B0502040204020203" pitchFamily="34" charset="0"/>
-            </a:endParaRPr>
-          </a:p>
-        </p:txBody>
-      </p:sp>
-      <p:sp>
-        <p:nvSpPr>
-          <p:cNvPr id="10" name="Oval 9">
-            <a:extLst>
-              <a:ext uri="{FF2B5EF4-FFF2-40B4-BE49-F238E27FC236}">
-                <a16:creationId xmlns:a16="http://schemas.microsoft.com/office/drawing/2014/main" id="{5592D62C-A74C-43F5-AD5A-F7FE8D391BFE}"/>
-              </a:ext>
-            </a:extLst>
-          </p:cNvPr>
-          <p:cNvSpPr/>
-          <p:nvPr/>
-        </p:nvSpPr>
-        <p:spPr>
-          <a:xfrm>
-            <a:off x="4900473" y="4705165"/>
-            <a:ext cx="640080" cy="639193"/>
-          </a:xfrm>
-          <a:prstGeom prst="ellipse">
-            <a:avLst/>
-          </a:prstGeom>
-          <a:solidFill>
-            <a:schemeClr val="bg1"/>
-          </a:solidFill>
-          <a:ln w="38100">
-            <a:solidFill>
-              <a:schemeClr val="tx2">
-                <a:lumMod val="50000"/>
-              </a:schemeClr>
-            </a:solidFill>
-          </a:ln>
-        </p:spPr>
-        <p:style>
-          <a:lnRef idx="2">
-            <a:schemeClr val="accent1">
-              <a:shade val="50000"/>
-            </a:schemeClr>
-          </a:lnRef>
-          <a:fillRef idx="1">
-            <a:schemeClr val="accent1"/>
-          </a:fillRef>
-          <a:effectRef idx="0">
-            <a:schemeClr val="accent1"/>
-          </a:effectRef>
-          <a:fontRef idx="minor">
-            <a:schemeClr val="lt1"/>
-          </a:fontRef>
-        </p:style>
-        <p:txBody>
-          <a:bodyPr rtlCol="0" anchor="ctr"/>
-          <a:lstStyle/>
-          <a:p>
-            <a:pPr algn="ctr"/>
-            <a:r>
-              <a:rPr lang="sv-SE" sz="3600" dirty="0">
-                <a:solidFill>
-                  <a:schemeClr val="tx1"/>
-                </a:solidFill>
-                <a:latin typeface="Bahnschrift" panose="020B0502040204020203" pitchFamily="34" charset="0"/>
-              </a:rPr>
-              <a:t>2</a:t>
-            </a:r>
-            <a:endParaRPr lang="en-US" sz="3600" dirty="0">
-              <a:solidFill>
-                <a:schemeClr val="tx1"/>
-              </a:solidFill>
-              <a:latin typeface="Bahnschrift" panose="020B0502040204020203" pitchFamily="34" charset="0"/>
-            </a:endParaRPr>
-          </a:p>
-        </p:txBody>
-      </p:sp>
-      <p:sp>
-        <p:nvSpPr>
-          <p:cNvPr id="11" name="Rectangle 10">
-            <a:extLst>
-              <a:ext uri="{FF2B5EF4-FFF2-40B4-BE49-F238E27FC236}">
-                <a16:creationId xmlns:a16="http://schemas.microsoft.com/office/drawing/2014/main" id="{4D799659-8AE6-49DC-A30F-0B9B1CF9F90D}"/>
-              </a:ext>
-            </a:extLst>
-          </p:cNvPr>
-          <p:cNvSpPr/>
-          <p:nvPr/>
-        </p:nvSpPr>
-        <p:spPr>
-          <a:xfrm>
-            <a:off x="347710" y="3943165"/>
-            <a:ext cx="4810218" cy="544499"/>
-          </a:xfrm>
-          <a:prstGeom prst="rect">
-            <a:avLst/>
-          </a:prstGeom>
-          <a:noFill/>
-          <a:ln>
-            <a:noFill/>
-          </a:ln>
-        </p:spPr>
-        <p:style>
-          <a:lnRef idx="2">
-            <a:schemeClr val="accent1">
-              <a:shade val="50000"/>
-            </a:schemeClr>
-          </a:lnRef>
-          <a:fillRef idx="1">
-            <a:schemeClr val="accent1"/>
-          </a:fillRef>
-          <a:effectRef idx="0">
-            <a:schemeClr val="accent1"/>
-          </a:effectRef>
-          <a:fontRef idx="minor">
-            <a:schemeClr val="lt1"/>
-          </a:fontRef>
-        </p:style>
-        <p:txBody>
-          <a:bodyPr rtlCol="0" anchor="t"/>
-          <a:lstStyle/>
-          <a:p>
-            <a:r>
-              <a:rPr lang="en-US" sz="2400" b="1" dirty="0">
-                <a:solidFill>
-                  <a:schemeClr val="tx1"/>
-                </a:solidFill>
-                <a:latin typeface="Bahnschrift" panose="020B0502040204020203" pitchFamily="34" charset="0"/>
-              </a:rPr>
-              <a:t>Agenda</a:t>
-            </a:r>
-          </a:p>
-          <a:p>
-            <a:endParaRPr lang="en-US" sz="2400" b="1" dirty="0">
-              <a:solidFill>
-                <a:schemeClr val="tx1"/>
-              </a:solidFill>
-              <a:latin typeface="Bahnschrift" panose="020B0502040204020203" pitchFamily="34" charset="0"/>
-            </a:endParaRPr>
-          </a:p>
-        </p:txBody>
-      </p:sp>
-      <p:cxnSp>
-        <p:nvCxnSpPr>
-          <p:cNvPr id="12" name="Straight Connector 11">
-            <a:extLst>
-              <a:ext uri="{FF2B5EF4-FFF2-40B4-BE49-F238E27FC236}">
-                <a16:creationId xmlns:a16="http://schemas.microsoft.com/office/drawing/2014/main" id="{1A0D831C-30DA-47B1-80F0-2F2389582AAB}"/>
-              </a:ext>
-            </a:extLst>
-          </p:cNvPr>
-          <p:cNvCxnSpPr>
-            <a:cxnSpLocks/>
-          </p:cNvCxnSpPr>
-          <p:nvPr/>
-        </p:nvCxnSpPr>
-        <p:spPr>
-          <a:xfrm>
-            <a:off x="338832" y="4462032"/>
-            <a:ext cx="8416180" cy="0"/>
-          </a:xfrm>
-          <a:prstGeom prst="line">
-            <a:avLst/>
-          </a:prstGeom>
-          <a:ln w="28575">
-            <a:solidFill>
-              <a:schemeClr val="tx1"/>
-            </a:solidFill>
-          </a:ln>
-        </p:spPr>
-        <p:style>
-          <a:lnRef idx="1">
-            <a:schemeClr val="accent1"/>
-          </a:lnRef>
-          <a:fillRef idx="0">
-            <a:schemeClr val="accent1"/>
-          </a:fillRef>
-          <a:effectRef idx="0">
-            <a:schemeClr val="accent1"/>
-          </a:effectRef>
-          <a:fontRef idx="minor">
-            <a:schemeClr val="tx1"/>
-          </a:fontRef>
-        </p:style>
-      </p:cxnSp>
       <p:cxnSp>
         <p:nvCxnSpPr>
           <p:cNvPr id="14" name="Straight Connector 13">
@@ -4089,7 +4462,7 @@
         </p:nvCxnSpPr>
         <p:spPr>
           <a:xfrm>
-            <a:off x="338832" y="1516123"/>
+            <a:off x="338832" y="4365863"/>
             <a:ext cx="8416180" cy="0"/>
           </a:xfrm>
           <a:prstGeom prst="line">
@@ -5767,6 +6140,89 @@
           <a:chExt cx="0" cy="0"/>
         </a:xfrm>
       </p:grpSpPr>
+      <p:pic>
+        <p:nvPicPr>
+          <p:cNvPr id="3" name="Picture 2">
+            <a:extLst>
+              <a:ext uri="{FF2B5EF4-FFF2-40B4-BE49-F238E27FC236}">
+                <a16:creationId xmlns:a16="http://schemas.microsoft.com/office/drawing/2014/main" id="{4A9E0E21-19FA-453A-891F-22D8865C467F}"/>
+              </a:ext>
+            </a:extLst>
+          </p:cNvPr>
+          <p:cNvPicPr>
+            <a:picLocks noChangeAspect="1"/>
+          </p:cNvPicPr>
+          <p:nvPr/>
+        </p:nvPicPr>
+        <p:blipFill rotWithShape="1">
+          <a:blip r:embed="rId2"/>
+          <a:srcRect t="1" b="18714"/>
+          <a:stretch/>
+        </p:blipFill>
+        <p:spPr>
+          <a:xfrm>
+            <a:off x="384255" y="3779397"/>
+            <a:ext cx="8357734" cy="2807834"/>
+          </a:xfrm>
+          <a:prstGeom prst="rect">
+            <a:avLst/>
+          </a:prstGeom>
+        </p:spPr>
+      </p:pic>
+      <p:sp>
+        <p:nvSpPr>
+          <p:cNvPr id="20" name="Rectangle 19">
+            <a:extLst>
+              <a:ext uri="{FF2B5EF4-FFF2-40B4-BE49-F238E27FC236}">
+                <a16:creationId xmlns:a16="http://schemas.microsoft.com/office/drawing/2014/main" id="{38C415C9-A83C-4473-A167-9FB5F115D92E}"/>
+              </a:ext>
+            </a:extLst>
+          </p:cNvPr>
+          <p:cNvSpPr/>
+          <p:nvPr/>
+        </p:nvSpPr>
+        <p:spPr>
+          <a:xfrm>
+            <a:off x="384254" y="3773231"/>
+            <a:ext cx="7959720" cy="2826853"/>
+          </a:xfrm>
+          <a:prstGeom prst="rect">
+            <a:avLst/>
+          </a:prstGeom>
+          <a:solidFill>
+            <a:srgbClr val="00B050">
+              <a:alpha val="9000"/>
+            </a:srgbClr>
+          </a:solidFill>
+          <a:ln>
+            <a:noFill/>
+          </a:ln>
+        </p:spPr>
+        <p:style>
+          <a:lnRef idx="2">
+            <a:schemeClr val="accent1">
+              <a:shade val="50000"/>
+            </a:schemeClr>
+          </a:lnRef>
+          <a:fillRef idx="1">
+            <a:schemeClr val="accent1"/>
+          </a:fillRef>
+          <a:effectRef idx="0">
+            <a:schemeClr val="accent1"/>
+          </a:effectRef>
+          <a:fontRef idx="minor">
+            <a:schemeClr val="lt1"/>
+          </a:fontRef>
+        </p:style>
+        <p:txBody>
+          <a:bodyPr rtlCol="0" anchor="ctr"/>
+          <a:lstStyle/>
+          <a:p>
+            <a:pPr algn="ctr"/>
+            <a:endParaRPr lang="en-US"/>
+          </a:p>
+        </p:txBody>
+      </p:sp>
       <p:sp>
         <p:nvSpPr>
           <p:cNvPr id="4" name="Rectangle 3">
@@ -5880,7 +6336,7 @@
                 </a:solidFill>
                 <a:latin typeface="Bahnschrift" panose="020B0502040204020203" pitchFamily="34" charset="0"/>
               </a:rPr>
-              <a:t>How ?</a:t>
+              <a:t>About the Dataset</a:t>
             </a:r>
             <a:endParaRPr lang="en-US" sz="2400" dirty="0">
               <a:solidFill>
@@ -5896,148 +6352,6 @@
               </a:solidFill>
               <a:latin typeface="Bahnschrift" panose="020B0502040204020203" pitchFamily="34" charset="0"/>
             </a:endParaRPr>
-          </a:p>
-        </p:txBody>
-      </p:sp>
-      <p:sp>
-        <p:nvSpPr>
-          <p:cNvPr id="10" name="Rectangle 9">
-            <a:extLst>
-              <a:ext uri="{FF2B5EF4-FFF2-40B4-BE49-F238E27FC236}">
-                <a16:creationId xmlns:a16="http://schemas.microsoft.com/office/drawing/2014/main" id="{5B5B45BC-1F43-4218-B9F6-B7444757043C}"/>
-              </a:ext>
-            </a:extLst>
-          </p:cNvPr>
-          <p:cNvSpPr/>
-          <p:nvPr/>
-        </p:nvSpPr>
-        <p:spPr>
-          <a:xfrm>
-            <a:off x="445747" y="1677879"/>
-            <a:ext cx="4641158" cy="4607511"/>
-          </a:xfrm>
-          <a:prstGeom prst="rect">
-            <a:avLst/>
-          </a:prstGeom>
-          <a:solidFill>
-            <a:schemeClr val="bg1">
-              <a:lumMod val="95000"/>
-            </a:schemeClr>
-          </a:solidFill>
-          <a:ln>
-            <a:noFill/>
-          </a:ln>
-        </p:spPr>
-        <p:style>
-          <a:lnRef idx="2">
-            <a:schemeClr val="accent1">
-              <a:shade val="50000"/>
-            </a:schemeClr>
-          </a:lnRef>
-          <a:fillRef idx="1">
-            <a:schemeClr val="accent1"/>
-          </a:fillRef>
-          <a:effectRef idx="0">
-            <a:schemeClr val="accent1"/>
-          </a:effectRef>
-          <a:fontRef idx="minor">
-            <a:schemeClr val="lt1"/>
-          </a:fontRef>
-        </p:style>
-        <p:txBody>
-          <a:bodyPr rtlCol="0" anchor="ctr"/>
-          <a:lstStyle/>
-          <a:p>
-            <a:pPr algn="ctr"/>
-            <a:endParaRPr lang="en-US"/>
-          </a:p>
-        </p:txBody>
-      </p:sp>
-      <p:sp>
-        <p:nvSpPr>
-          <p:cNvPr id="11" name="Rectangle 10">
-            <a:extLst>
-              <a:ext uri="{FF2B5EF4-FFF2-40B4-BE49-F238E27FC236}">
-                <a16:creationId xmlns:a16="http://schemas.microsoft.com/office/drawing/2014/main" id="{47FFCEE0-3742-4BC2-9BB6-60347E3E49BA}"/>
-              </a:ext>
-            </a:extLst>
-          </p:cNvPr>
-          <p:cNvSpPr/>
-          <p:nvPr/>
-        </p:nvSpPr>
-        <p:spPr>
-          <a:xfrm>
-            <a:off x="568171" y="1793293"/>
-            <a:ext cx="4403324" cy="3869186"/>
-          </a:xfrm>
-          <a:prstGeom prst="rect">
-            <a:avLst/>
-          </a:prstGeom>
-          <a:noFill/>
-          <a:ln>
-            <a:noFill/>
-          </a:ln>
-        </p:spPr>
-        <p:style>
-          <a:lnRef idx="2">
-            <a:schemeClr val="accent1">
-              <a:shade val="50000"/>
-            </a:schemeClr>
-          </a:lnRef>
-          <a:fillRef idx="1">
-            <a:schemeClr val="accent1"/>
-          </a:fillRef>
-          <a:effectRef idx="0">
-            <a:schemeClr val="accent1"/>
-          </a:effectRef>
-          <a:fontRef idx="minor">
-            <a:schemeClr val="lt1"/>
-          </a:fontRef>
-        </p:style>
-        <p:txBody>
-          <a:bodyPr rtlCol="0" anchor="t"/>
-          <a:lstStyle/>
-          <a:p>
-            <a:pPr marL="285750" indent="-285750">
-              <a:buFont typeface="Arial" panose="020B0604020202020204" pitchFamily="34" charset="0"/>
-              <a:buChar char="•"/>
-            </a:pPr>
-            <a:r>
-              <a:rPr lang="en-US" dirty="0">
-                <a:solidFill>
-                  <a:schemeClr val="tx1"/>
-                </a:solidFill>
-                <a:latin typeface="Bahnschrift" panose="020B0502040204020203" pitchFamily="34" charset="0"/>
-              </a:rPr>
-              <a:t>Two traditional machine learning models were developed, compared, and finally combined in an ensemble model</a:t>
-            </a:r>
-          </a:p>
-          <a:p>
-            <a:pPr marL="285750" indent="-285750">
-              <a:buFont typeface="Arial" panose="020B0604020202020204" pitchFamily="34" charset="0"/>
-              <a:buChar char="•"/>
-            </a:pPr>
-            <a:endParaRPr lang="en-US" dirty="0">
-              <a:solidFill>
-                <a:schemeClr val="tx1"/>
-              </a:solidFill>
-              <a:latin typeface="Bahnschrift" panose="020B0502040204020203" pitchFamily="34" charset="0"/>
-            </a:endParaRPr>
-          </a:p>
-          <a:p>
-            <a:pPr marL="285750" indent="-285750">
-              <a:buFont typeface="Arial" panose="020B0604020202020204" pitchFamily="34" charset="0"/>
-              <a:buChar char="•"/>
-            </a:pPr>
-            <a:r>
-              <a:rPr lang="en-US" dirty="0">
-                <a:solidFill>
-                  <a:schemeClr val="tx1"/>
-                </a:solidFill>
-                <a:latin typeface="Bahnschrift" panose="020B0502040204020203" pitchFamily="34" charset="0"/>
-              </a:rPr>
-              <a:t>One deep learning model was built to explore potential changes in performance</a:t>
-            </a:r>
           </a:p>
         </p:txBody>
       </p:sp>
@@ -6104,10 +6418,387 @@
           </a:p>
         </p:txBody>
       </p:sp>
+      <p:sp>
+        <p:nvSpPr>
+          <p:cNvPr id="24" name="Rectangle 23">
+            <a:extLst>
+              <a:ext uri="{FF2B5EF4-FFF2-40B4-BE49-F238E27FC236}">
+                <a16:creationId xmlns:a16="http://schemas.microsoft.com/office/drawing/2014/main" id="{D8FEDC11-95B5-4494-A690-75C0DD9AE0E1}"/>
+              </a:ext>
+            </a:extLst>
+          </p:cNvPr>
+          <p:cNvSpPr/>
+          <p:nvPr/>
+        </p:nvSpPr>
+        <p:spPr>
+          <a:xfrm>
+            <a:off x="8343973" y="3773231"/>
+            <a:ext cx="398015" cy="2820688"/>
+          </a:xfrm>
+          <a:prstGeom prst="rect">
+            <a:avLst/>
+          </a:prstGeom>
+          <a:solidFill>
+            <a:srgbClr val="0070C0">
+              <a:alpha val="9000"/>
+            </a:srgbClr>
+          </a:solidFill>
+          <a:ln>
+            <a:noFill/>
+          </a:ln>
+        </p:spPr>
+        <p:style>
+          <a:lnRef idx="2">
+            <a:schemeClr val="accent1">
+              <a:shade val="50000"/>
+            </a:schemeClr>
+          </a:lnRef>
+          <a:fillRef idx="1">
+            <a:schemeClr val="accent1"/>
+          </a:fillRef>
+          <a:effectRef idx="0">
+            <a:schemeClr val="accent1"/>
+          </a:effectRef>
+          <a:fontRef idx="minor">
+            <a:schemeClr val="lt1"/>
+          </a:fontRef>
+        </p:style>
+        <p:txBody>
+          <a:bodyPr rtlCol="0" anchor="ctr"/>
+          <a:lstStyle/>
+          <a:p>
+            <a:pPr algn="ctr"/>
+            <a:endParaRPr lang="en-US"/>
+          </a:p>
+        </p:txBody>
+      </p:sp>
+      <p:sp>
+        <p:nvSpPr>
+          <p:cNvPr id="12" name="Rectangle 11">
+            <a:extLst>
+              <a:ext uri="{FF2B5EF4-FFF2-40B4-BE49-F238E27FC236}">
+                <a16:creationId xmlns:a16="http://schemas.microsoft.com/office/drawing/2014/main" id="{21B20258-CF25-4390-9A5E-7668E5792417}"/>
+              </a:ext>
+            </a:extLst>
+          </p:cNvPr>
+          <p:cNvSpPr/>
+          <p:nvPr/>
+        </p:nvSpPr>
+        <p:spPr>
+          <a:xfrm>
+            <a:off x="338832" y="3425739"/>
+            <a:ext cx="2244570" cy="328472"/>
+          </a:xfrm>
+          <a:prstGeom prst="rect">
+            <a:avLst/>
+          </a:prstGeom>
+          <a:noFill/>
+          <a:ln>
+            <a:noFill/>
+          </a:ln>
+        </p:spPr>
+        <p:style>
+          <a:lnRef idx="2">
+            <a:schemeClr val="accent1">
+              <a:shade val="50000"/>
+            </a:schemeClr>
+          </a:lnRef>
+          <a:fillRef idx="1">
+            <a:schemeClr val="accent1"/>
+          </a:fillRef>
+          <a:effectRef idx="0">
+            <a:schemeClr val="accent1"/>
+          </a:effectRef>
+          <a:fontRef idx="minor">
+            <a:schemeClr val="lt1"/>
+          </a:fontRef>
+        </p:style>
+        <p:txBody>
+          <a:bodyPr rtlCol="0" anchor="t"/>
+          <a:lstStyle/>
+          <a:p>
+            <a:r>
+              <a:rPr lang="en-US" sz="1600" b="1" dirty="0">
+                <a:solidFill>
+                  <a:srgbClr val="00B050"/>
+                </a:solidFill>
+                <a:latin typeface="Bahnschrift" panose="020B0502040204020203" pitchFamily="34" charset="0"/>
+              </a:rPr>
+              <a:t>Feature Variables</a:t>
+            </a:r>
+            <a:endParaRPr lang="en-US" sz="1600" dirty="0">
+              <a:solidFill>
+                <a:srgbClr val="00B050"/>
+              </a:solidFill>
+              <a:latin typeface="Bahnschrift" panose="020B0502040204020203" pitchFamily="34" charset="0"/>
+            </a:endParaRPr>
+          </a:p>
+          <a:p>
+            <a:pPr marL="285750" indent="-285750">
+              <a:buFont typeface="Arial" panose="020B0604020202020204" pitchFamily="34" charset="0"/>
+              <a:buChar char="•"/>
+            </a:pPr>
+            <a:endParaRPr lang="en-US" sz="1600" dirty="0">
+              <a:solidFill>
+                <a:srgbClr val="C00000"/>
+              </a:solidFill>
+              <a:latin typeface="Bahnschrift" panose="020B0502040204020203" pitchFamily="34" charset="0"/>
+            </a:endParaRPr>
+          </a:p>
+          <a:p>
+            <a:pPr marL="285750" indent="-285750">
+              <a:buFont typeface="Arial" panose="020B0604020202020204" pitchFamily="34" charset="0"/>
+              <a:buChar char="•"/>
+            </a:pPr>
+            <a:endParaRPr lang="en-US" sz="1200" dirty="0">
+              <a:solidFill>
+                <a:srgbClr val="C00000"/>
+              </a:solidFill>
+              <a:latin typeface="Bahnschrift" panose="020B0502040204020203" pitchFamily="34" charset="0"/>
+            </a:endParaRPr>
+          </a:p>
+        </p:txBody>
+      </p:sp>
+      <p:sp>
+        <p:nvSpPr>
+          <p:cNvPr id="13" name="Rectangle 12">
+            <a:extLst>
+              <a:ext uri="{FF2B5EF4-FFF2-40B4-BE49-F238E27FC236}">
+                <a16:creationId xmlns:a16="http://schemas.microsoft.com/office/drawing/2014/main" id="{20C3612D-DC46-422E-A6A1-ADB3FF266C81}"/>
+              </a:ext>
+            </a:extLst>
+          </p:cNvPr>
+          <p:cNvSpPr/>
+          <p:nvPr/>
+        </p:nvSpPr>
+        <p:spPr>
+          <a:xfrm>
+            <a:off x="6542844" y="3425739"/>
+            <a:ext cx="2244570" cy="328472"/>
+          </a:xfrm>
+          <a:prstGeom prst="rect">
+            <a:avLst/>
+          </a:prstGeom>
+          <a:noFill/>
+          <a:ln>
+            <a:noFill/>
+          </a:ln>
+        </p:spPr>
+        <p:style>
+          <a:lnRef idx="2">
+            <a:schemeClr val="accent1">
+              <a:shade val="50000"/>
+            </a:schemeClr>
+          </a:lnRef>
+          <a:fillRef idx="1">
+            <a:schemeClr val="accent1"/>
+          </a:fillRef>
+          <a:effectRef idx="0">
+            <a:schemeClr val="accent1"/>
+          </a:effectRef>
+          <a:fontRef idx="minor">
+            <a:schemeClr val="lt1"/>
+          </a:fontRef>
+        </p:style>
+        <p:txBody>
+          <a:bodyPr rtlCol="0" anchor="t"/>
+          <a:lstStyle/>
+          <a:p>
+            <a:pPr algn="r"/>
+            <a:r>
+              <a:rPr lang="en-US" sz="1600" b="1" dirty="0">
+                <a:solidFill>
+                  <a:srgbClr val="0070C0"/>
+                </a:solidFill>
+                <a:latin typeface="Bahnschrift" panose="020B0502040204020203" pitchFamily="34" charset="0"/>
+              </a:rPr>
+              <a:t>Target Variable </a:t>
+            </a:r>
+            <a:r>
+              <a:rPr lang="en-US" sz="1600" dirty="0">
+                <a:solidFill>
+                  <a:srgbClr val="0070C0"/>
+                </a:solidFill>
+                <a:latin typeface="Bahnschrift" panose="020B0502040204020203" pitchFamily="34" charset="0"/>
+              </a:rPr>
+              <a:t>Churn</a:t>
+            </a:r>
+          </a:p>
+          <a:p>
+            <a:pPr marL="285750" indent="-285750" algn="r">
+              <a:buFont typeface="Arial" panose="020B0604020202020204" pitchFamily="34" charset="0"/>
+              <a:buChar char="•"/>
+            </a:pPr>
+            <a:endParaRPr lang="en-US" sz="1600" dirty="0">
+              <a:solidFill>
+                <a:srgbClr val="0070C0"/>
+              </a:solidFill>
+              <a:latin typeface="Bahnschrift" panose="020B0502040204020203" pitchFamily="34" charset="0"/>
+            </a:endParaRPr>
+          </a:p>
+          <a:p>
+            <a:pPr marL="285750" indent="-285750" algn="r">
+              <a:buFont typeface="Arial" panose="020B0604020202020204" pitchFamily="34" charset="0"/>
+              <a:buChar char="•"/>
+            </a:pPr>
+            <a:endParaRPr lang="en-US" sz="1200" dirty="0">
+              <a:solidFill>
+                <a:srgbClr val="0070C0"/>
+              </a:solidFill>
+              <a:latin typeface="Bahnschrift" panose="020B0502040204020203" pitchFamily="34" charset="0"/>
+            </a:endParaRPr>
+          </a:p>
+        </p:txBody>
+      </p:sp>
+      <p:sp>
+        <p:nvSpPr>
+          <p:cNvPr id="27" name="Rectangle 26">
+            <a:extLst>
+              <a:ext uri="{FF2B5EF4-FFF2-40B4-BE49-F238E27FC236}">
+                <a16:creationId xmlns:a16="http://schemas.microsoft.com/office/drawing/2014/main" id="{F7CFA3D8-6A6C-4687-B76A-9A1BF8E8C631}"/>
+              </a:ext>
+            </a:extLst>
+          </p:cNvPr>
+          <p:cNvSpPr/>
+          <p:nvPr/>
+        </p:nvSpPr>
+        <p:spPr>
+          <a:xfrm>
+            <a:off x="338832" y="1642371"/>
+            <a:ext cx="8467817" cy="948865"/>
+          </a:xfrm>
+          <a:prstGeom prst="rect">
+            <a:avLst/>
+          </a:prstGeom>
+          <a:noFill/>
+          <a:ln>
+            <a:noFill/>
+          </a:ln>
+        </p:spPr>
+        <p:style>
+          <a:lnRef idx="2">
+            <a:schemeClr val="accent1">
+              <a:shade val="50000"/>
+            </a:schemeClr>
+          </a:lnRef>
+          <a:fillRef idx="1">
+            <a:schemeClr val="accent1"/>
+          </a:fillRef>
+          <a:effectRef idx="0">
+            <a:schemeClr val="accent1"/>
+          </a:effectRef>
+          <a:fontRef idx="minor">
+            <a:schemeClr val="lt1"/>
+          </a:fontRef>
+        </p:style>
+        <p:txBody>
+          <a:bodyPr rtlCol="0" anchor="t"/>
+          <a:lstStyle/>
+          <a:p>
+            <a:pPr marL="285750" indent="-285750">
+              <a:buFont typeface="Arial" panose="020B0604020202020204" pitchFamily="34" charset="0"/>
+              <a:buChar char="•"/>
+            </a:pPr>
+            <a:r>
+              <a:rPr lang="en-US" sz="1600" dirty="0">
+                <a:solidFill>
+                  <a:schemeClr val="tx1"/>
+                </a:solidFill>
+                <a:latin typeface="Bahnschrift" panose="020B0502040204020203" pitchFamily="34" charset="0"/>
+              </a:rPr>
+              <a:t>Each row represents one customer</a:t>
+            </a:r>
+          </a:p>
+          <a:p>
+            <a:pPr marL="285750" indent="-285750">
+              <a:buFont typeface="Arial" panose="020B0604020202020204" pitchFamily="34" charset="0"/>
+              <a:buChar char="•"/>
+            </a:pPr>
+            <a:endParaRPr lang="en-US" sz="1600" dirty="0">
+              <a:solidFill>
+                <a:schemeClr val="tx1"/>
+              </a:solidFill>
+              <a:latin typeface="Bahnschrift" panose="020B0502040204020203" pitchFamily="34" charset="0"/>
+            </a:endParaRPr>
+          </a:p>
+          <a:p>
+            <a:pPr marL="285750" indent="-285750">
+              <a:buFont typeface="Arial" panose="020B0604020202020204" pitchFamily="34" charset="0"/>
+              <a:buChar char="•"/>
+            </a:pPr>
+            <a:r>
+              <a:rPr lang="en-US" sz="1600" dirty="0">
+                <a:solidFill>
+                  <a:schemeClr val="tx1"/>
+                </a:solidFill>
+                <a:latin typeface="Bahnschrift" panose="020B0502040204020203" pitchFamily="34" charset="0"/>
+              </a:rPr>
+              <a:t>The </a:t>
+            </a:r>
+            <a:r>
+              <a:rPr lang="en-US" sz="1600" b="1" dirty="0">
+                <a:solidFill>
+                  <a:srgbClr val="00B050"/>
+                </a:solidFill>
+                <a:latin typeface="Bahnschrift" panose="020B0502040204020203" pitchFamily="34" charset="0"/>
+              </a:rPr>
+              <a:t>Feature Variables </a:t>
+            </a:r>
+            <a:r>
+              <a:rPr lang="en-US" sz="1600" dirty="0">
+                <a:solidFill>
+                  <a:schemeClr val="tx1"/>
+                </a:solidFill>
+                <a:latin typeface="Bahnschrift" panose="020B0502040204020203" pitchFamily="34" charset="0"/>
+              </a:rPr>
+              <a:t>contains both categorical and continuous data</a:t>
+            </a:r>
+          </a:p>
+          <a:p>
+            <a:pPr marL="285750" indent="-285750">
+              <a:buFont typeface="Arial" panose="020B0604020202020204" pitchFamily="34" charset="0"/>
+              <a:buChar char="•"/>
+            </a:pPr>
+            <a:endParaRPr lang="en-US" sz="1600" dirty="0">
+              <a:solidFill>
+                <a:schemeClr val="tx1"/>
+              </a:solidFill>
+              <a:latin typeface="Bahnschrift" panose="020B0502040204020203" pitchFamily="34" charset="0"/>
+            </a:endParaRPr>
+          </a:p>
+          <a:p>
+            <a:pPr marL="285750" indent="-285750">
+              <a:buClr>
+                <a:schemeClr val="tx1"/>
+              </a:buClr>
+              <a:buFont typeface="Arial" panose="020B0604020202020204" pitchFamily="34" charset="0"/>
+              <a:buChar char="•"/>
+            </a:pPr>
+            <a:r>
+              <a:rPr lang="en-US" sz="1600" b="1" dirty="0">
+                <a:solidFill>
+                  <a:srgbClr val="0070C0"/>
+                </a:solidFill>
+                <a:latin typeface="Bahnschrift" panose="020B0502040204020203" pitchFamily="34" charset="0"/>
+              </a:rPr>
+              <a:t>Target Variable </a:t>
+            </a:r>
+            <a:r>
+              <a:rPr lang="en-US" sz="1600" dirty="0">
+                <a:solidFill>
+                  <a:schemeClr val="tx1"/>
+                </a:solidFill>
+                <a:latin typeface="Bahnschrift" panose="020B0502040204020203" pitchFamily="34" charset="0"/>
+              </a:rPr>
+              <a:t>is binary (Yes / No)</a:t>
+            </a:r>
+          </a:p>
+        </p:txBody>
+      </p:sp>
     </p:spTree>
     <p:extLst>
       <p:ext uri="{BB962C8B-B14F-4D97-AF65-F5344CB8AC3E}">
-        <p14:creationId xmlns:p14="http://schemas.microsoft.com/office/powerpoint/2010/main" val="1054600485"/>
+        <p14:creationId xmlns:p14="http://schemas.microsoft.com/office/powerpoint/2010/main" val="2799488744"/>
       </p:ext>
     </p:extLst>
   </p:cSld>
@@ -6134,41 +6825,12 @@
           <a:chExt cx="0" cy="0"/>
         </a:xfrm>
       </p:grpSpPr>
-      <p:pic>
-        <p:nvPicPr>
-          <p:cNvPr id="3" name="Picture 2">
+      <p:sp>
+        <p:nvSpPr>
+          <p:cNvPr id="61" name="Rectangle 60">
             <a:extLst>
               <a:ext uri="{FF2B5EF4-FFF2-40B4-BE49-F238E27FC236}">
-                <a16:creationId xmlns:a16="http://schemas.microsoft.com/office/drawing/2014/main" id="{4A9E0E21-19FA-453A-891F-22D8865C467F}"/>
-              </a:ext>
-            </a:extLst>
-          </p:cNvPr>
-          <p:cNvPicPr>
-            <a:picLocks noChangeAspect="1"/>
-          </p:cNvPicPr>
-          <p:nvPr/>
-        </p:nvPicPr>
-        <p:blipFill rotWithShape="1">
-          <a:blip r:embed="rId2"/>
-          <a:srcRect t="1" b="18714"/>
-          <a:stretch/>
-        </p:blipFill>
-        <p:spPr>
-          <a:xfrm>
-            <a:off x="384255" y="3779397"/>
-            <a:ext cx="8357734" cy="2807834"/>
-          </a:xfrm>
-          <a:prstGeom prst="rect">
-            <a:avLst/>
-          </a:prstGeom>
-        </p:spPr>
-      </p:pic>
-      <p:sp>
-        <p:nvSpPr>
-          <p:cNvPr id="20" name="Rectangle 19">
-            <a:extLst>
-              <a:ext uri="{FF2B5EF4-FFF2-40B4-BE49-F238E27FC236}">
-                <a16:creationId xmlns:a16="http://schemas.microsoft.com/office/drawing/2014/main" id="{38C415C9-A83C-4473-A167-9FB5F115D92E}"/>
+                <a16:creationId xmlns:a16="http://schemas.microsoft.com/office/drawing/2014/main" id="{745B9B94-7A71-437A-9082-70B1DB273368}"/>
               </a:ext>
             </a:extLst>
           </p:cNvPr>
@@ -6177,16 +6839,182 @@
         </p:nvSpPr>
         <p:spPr>
           <a:xfrm>
-            <a:off x="384254" y="3773231"/>
-            <a:ext cx="7959720" cy="2826853"/>
+            <a:off x="3337216" y="4751316"/>
+            <a:ext cx="5202485" cy="1862668"/>
           </a:xfrm>
           <a:prstGeom prst="rect">
             <a:avLst/>
           </a:prstGeom>
           <a:solidFill>
-            <a:srgbClr val="00B050">
-              <a:alpha val="9000"/>
-            </a:srgbClr>
+            <a:schemeClr val="accent6">
+              <a:lumMod val="20000"/>
+              <a:lumOff val="80000"/>
+            </a:schemeClr>
+          </a:solidFill>
+          <a:ln>
+            <a:noFill/>
+          </a:ln>
+        </p:spPr>
+        <p:style>
+          <a:lnRef idx="2">
+            <a:schemeClr val="accent1">
+              <a:shade val="50000"/>
+            </a:schemeClr>
+          </a:lnRef>
+          <a:fillRef idx="1">
+            <a:schemeClr val="accent1"/>
+          </a:fillRef>
+          <a:effectRef idx="0">
+            <a:schemeClr val="accent1"/>
+          </a:effectRef>
+          <a:fontRef idx="minor">
+            <a:schemeClr val="lt1"/>
+          </a:fontRef>
+        </p:style>
+        <p:txBody>
+          <a:bodyPr rtlCol="0" anchor="ctr"/>
+          <a:lstStyle/>
+          <a:p>
+            <a:pPr algn="ctr"/>
+            <a:endParaRPr lang="en-US"/>
+          </a:p>
+        </p:txBody>
+      </p:sp>
+      <p:sp>
+        <p:nvSpPr>
+          <p:cNvPr id="43" name="Rectangle 42">
+            <a:extLst>
+              <a:ext uri="{FF2B5EF4-FFF2-40B4-BE49-F238E27FC236}">
+                <a16:creationId xmlns:a16="http://schemas.microsoft.com/office/drawing/2014/main" id="{3A6CEE95-7ECA-48D5-BAA1-9FF20EA6BE63}"/>
+              </a:ext>
+            </a:extLst>
+          </p:cNvPr>
+          <p:cNvSpPr/>
+          <p:nvPr/>
+        </p:nvSpPr>
+        <p:spPr>
+          <a:xfrm>
+            <a:off x="6070822" y="2136626"/>
+            <a:ext cx="2468880" cy="1862668"/>
+          </a:xfrm>
+          <a:prstGeom prst="rect">
+            <a:avLst/>
+          </a:prstGeom>
+          <a:solidFill>
+            <a:schemeClr val="accent5">
+              <a:lumMod val="20000"/>
+              <a:lumOff val="80000"/>
+            </a:schemeClr>
+          </a:solidFill>
+          <a:ln>
+            <a:noFill/>
+          </a:ln>
+        </p:spPr>
+        <p:style>
+          <a:lnRef idx="2">
+            <a:schemeClr val="accent1">
+              <a:shade val="50000"/>
+            </a:schemeClr>
+          </a:lnRef>
+          <a:fillRef idx="1">
+            <a:schemeClr val="accent1"/>
+          </a:fillRef>
+          <a:effectRef idx="0">
+            <a:schemeClr val="accent1"/>
+          </a:effectRef>
+          <a:fontRef idx="minor">
+            <a:schemeClr val="lt1"/>
+          </a:fontRef>
+        </p:style>
+        <p:txBody>
+          <a:bodyPr rtlCol="0" anchor="ctr"/>
+          <a:lstStyle/>
+          <a:p>
+            <a:pPr algn="ctr"/>
+            <a:endParaRPr lang="en-US"/>
+          </a:p>
+        </p:txBody>
+      </p:sp>
+      <p:sp>
+        <p:nvSpPr>
+          <p:cNvPr id="38" name="Rectangle 37">
+            <a:extLst>
+              <a:ext uri="{FF2B5EF4-FFF2-40B4-BE49-F238E27FC236}">
+                <a16:creationId xmlns:a16="http://schemas.microsoft.com/office/drawing/2014/main" id="{A06C0561-4966-40BF-B9F3-F13A7E7192E7}"/>
+              </a:ext>
+            </a:extLst>
+          </p:cNvPr>
+          <p:cNvSpPr/>
+          <p:nvPr/>
+        </p:nvSpPr>
+        <p:spPr>
+          <a:xfrm>
+            <a:off x="3337114" y="2136626"/>
+            <a:ext cx="2468880" cy="1862668"/>
+          </a:xfrm>
+          <a:prstGeom prst="rect">
+            <a:avLst/>
+          </a:prstGeom>
+          <a:solidFill>
+            <a:schemeClr val="accent5">
+              <a:lumMod val="20000"/>
+              <a:lumOff val="80000"/>
+            </a:schemeClr>
+          </a:solidFill>
+          <a:ln>
+            <a:noFill/>
+          </a:ln>
+        </p:spPr>
+        <p:style>
+          <a:lnRef idx="2">
+            <a:schemeClr val="accent1">
+              <a:shade val="50000"/>
+            </a:schemeClr>
+          </a:lnRef>
+          <a:fillRef idx="1">
+            <a:schemeClr val="accent1"/>
+          </a:fillRef>
+          <a:effectRef idx="0">
+            <a:schemeClr val="accent1"/>
+          </a:effectRef>
+          <a:fontRef idx="minor">
+            <a:schemeClr val="lt1"/>
+          </a:fontRef>
+        </p:style>
+        <p:txBody>
+          <a:bodyPr rtlCol="0" anchor="ctr"/>
+          <a:lstStyle/>
+          <a:p>
+            <a:pPr algn="ctr"/>
+            <a:endParaRPr lang="en-US"/>
+          </a:p>
+        </p:txBody>
+      </p:sp>
+      <p:sp>
+        <p:nvSpPr>
+          <p:cNvPr id="37" name="Rectangle 36">
+            <a:extLst>
+              <a:ext uri="{FF2B5EF4-FFF2-40B4-BE49-F238E27FC236}">
+                <a16:creationId xmlns:a16="http://schemas.microsoft.com/office/drawing/2014/main" id="{1C070BA8-33AC-4B59-818E-910352ABFDB6}"/>
+              </a:ext>
+            </a:extLst>
+          </p:cNvPr>
+          <p:cNvSpPr/>
+          <p:nvPr/>
+        </p:nvSpPr>
+        <p:spPr>
+          <a:xfrm>
+            <a:off x="603405" y="2136626"/>
+            <a:ext cx="2468880" cy="1862668"/>
+          </a:xfrm>
+          <a:prstGeom prst="rect">
+            <a:avLst/>
+          </a:prstGeom>
+          <a:solidFill>
+            <a:schemeClr val="accent5">
+              <a:lumMod val="20000"/>
+              <a:lumOff val="80000"/>
+            </a:schemeClr>
           </a:solidFill>
           <a:ln>
             <a:noFill/>
@@ -6330,7 +7158,7 @@
                 </a:solidFill>
                 <a:latin typeface="Bahnschrift" panose="020B0502040204020203" pitchFamily="34" charset="0"/>
               </a:rPr>
-              <a:t>About the Dataset</a:t>
+              <a:t>How ?</a:t>
             </a:r>
             <a:endParaRPr lang="en-US" sz="2400" dirty="0">
               <a:solidFill>
@@ -6414,10 +7242,10 @@
       </p:sp>
       <p:sp>
         <p:nvSpPr>
-          <p:cNvPr id="24" name="Rectangle 23">
+          <p:cNvPr id="13" name="Rectangle 12">
             <a:extLst>
               <a:ext uri="{FF2B5EF4-FFF2-40B4-BE49-F238E27FC236}">
-                <a16:creationId xmlns:a16="http://schemas.microsoft.com/office/drawing/2014/main" id="{D8FEDC11-95B5-4494-A690-75C0DD9AE0E1}"/>
+                <a16:creationId xmlns:a16="http://schemas.microsoft.com/office/drawing/2014/main" id="{4D422A60-96BA-403C-83A2-B3C2E7A58940}"/>
               </a:ext>
             </a:extLst>
           </p:cNvPr>
@@ -6426,17 +7254,13 @@
         </p:nvSpPr>
         <p:spPr>
           <a:xfrm>
-            <a:off x="8343973" y="3773231"/>
-            <a:ext cx="398015" cy="2820688"/>
+            <a:off x="497771" y="1526957"/>
+            <a:ext cx="5656947" cy="376262"/>
           </a:xfrm>
           <a:prstGeom prst="rect">
             <a:avLst/>
           </a:prstGeom>
-          <a:solidFill>
-            <a:srgbClr val="0070C0">
-              <a:alpha val="9000"/>
-            </a:srgbClr>
-          </a:solidFill>
+          <a:noFill/>
           <a:ln>
             <a:noFill/>
           </a:ln>
@@ -6458,20 +7282,35 @@
           </a:fontRef>
         </p:style>
         <p:txBody>
-          <a:bodyPr rtlCol="0" anchor="ctr"/>
-          <a:lstStyle/>
-          <a:p>
-            <a:pPr algn="ctr"/>
-            <a:endParaRPr lang="en-US"/>
-          </a:p>
-        </p:txBody>
-      </p:sp>
-      <p:sp>
-        <p:nvSpPr>
-          <p:cNvPr id="12" name="Rectangle 11">
+          <a:bodyPr rtlCol="0" anchor="t"/>
+          <a:lstStyle/>
+          <a:p>
+            <a:r>
+              <a:rPr lang="en-US" b="1" dirty="0">
+                <a:solidFill>
+                  <a:schemeClr val="tx1"/>
+                </a:solidFill>
+                <a:latin typeface="Bahnschrift" panose="020B0502040204020203" pitchFamily="34" charset="0"/>
+              </a:rPr>
+              <a:t>Step 1: Traditional Machine Learning</a:t>
+            </a:r>
+          </a:p>
+          <a:p>
+            <a:endParaRPr lang="en-US" b="1" dirty="0">
+              <a:solidFill>
+                <a:schemeClr val="tx1"/>
+              </a:solidFill>
+              <a:latin typeface="Bahnschrift" panose="020B0502040204020203" pitchFamily="34" charset="0"/>
+            </a:endParaRPr>
+          </a:p>
+        </p:txBody>
+      </p:sp>
+      <p:sp>
+        <p:nvSpPr>
+          <p:cNvPr id="14" name="Rectangle 13">
             <a:extLst>
               <a:ext uri="{FF2B5EF4-FFF2-40B4-BE49-F238E27FC236}">
-                <a16:creationId xmlns:a16="http://schemas.microsoft.com/office/drawing/2014/main" id="{21B20258-CF25-4390-9A5E-7668E5792417}"/>
+                <a16:creationId xmlns:a16="http://schemas.microsoft.com/office/drawing/2014/main" id="{9B7194AC-8C9B-4DE6-A4A2-CDBFA6C0FF5E}"/>
               </a:ext>
             </a:extLst>
           </p:cNvPr>
@@ -6480,8 +7319,8 @@
         </p:nvSpPr>
         <p:spPr>
           <a:xfrm>
-            <a:off x="338832" y="3425739"/>
-            <a:ext cx="2244570" cy="328472"/>
+            <a:off x="497771" y="4134729"/>
+            <a:ext cx="2708673" cy="376262"/>
           </a:xfrm>
           <a:prstGeom prst="rect">
             <a:avLst/>
@@ -6512,53 +7351,115 @@
           <a:lstStyle/>
           <a:p>
             <a:r>
-              <a:rPr lang="en-US" sz="1600" b="1" dirty="0">
+              <a:rPr lang="en-US" b="1" dirty="0">
                 <a:solidFill>
-                  <a:srgbClr val="00B050"/>
+                  <a:schemeClr val="tx1"/>
                 </a:solidFill>
                 <a:latin typeface="Bahnschrift" panose="020B0502040204020203" pitchFamily="34" charset="0"/>
               </a:rPr>
-              <a:t>Feature Variables</a:t>
-            </a:r>
-            <a:endParaRPr lang="en-US" sz="1600" dirty="0">
+              <a:t>Step 2: Deep Learning</a:t>
+            </a:r>
+            <a:endParaRPr lang="en-US" sz="1200" b="1" dirty="0">
               <a:solidFill>
-                <a:srgbClr val="00B050"/>
+                <a:schemeClr val="tx1"/>
               </a:solidFill>
               <a:latin typeface="Bahnschrift" panose="020B0502040204020203" pitchFamily="34" charset="0"/>
             </a:endParaRPr>
           </a:p>
-          <a:p>
-            <a:pPr marL="285750" indent="-285750">
-              <a:buFont typeface="Arial" panose="020B0604020202020204" pitchFamily="34" charset="0"/>
-              <a:buChar char="•"/>
-            </a:pPr>
-            <a:endParaRPr lang="en-US" sz="1600" dirty="0">
-              <a:solidFill>
-                <a:srgbClr val="C00000"/>
-              </a:solidFill>
-              <a:latin typeface="Bahnschrift" panose="020B0502040204020203" pitchFamily="34" charset="0"/>
-            </a:endParaRPr>
-          </a:p>
-          <a:p>
-            <a:pPr marL="285750" indent="-285750">
-              <a:buFont typeface="Arial" panose="020B0604020202020204" pitchFamily="34" charset="0"/>
-              <a:buChar char="•"/>
-            </a:pPr>
-            <a:endParaRPr lang="en-US" sz="1200" dirty="0">
-              <a:solidFill>
-                <a:srgbClr val="C00000"/>
-              </a:solidFill>
-              <a:latin typeface="Bahnschrift" panose="020B0502040204020203" pitchFamily="34" charset="0"/>
-            </a:endParaRPr>
-          </a:p>
-        </p:txBody>
-      </p:sp>
-      <p:sp>
-        <p:nvSpPr>
-          <p:cNvPr id="13" name="Rectangle 12">
+        </p:txBody>
+      </p:sp>
+      <p:cxnSp>
+        <p:nvCxnSpPr>
+          <p:cNvPr id="18" name="Straight Connector 17">
             <a:extLst>
               <a:ext uri="{FF2B5EF4-FFF2-40B4-BE49-F238E27FC236}">
-                <a16:creationId xmlns:a16="http://schemas.microsoft.com/office/drawing/2014/main" id="{20C3612D-DC46-422E-A6A1-ADB3FF266C81}"/>
+                <a16:creationId xmlns:a16="http://schemas.microsoft.com/office/drawing/2014/main" id="{AF04AC52-EA46-4B5C-910D-1EC1A1BB3C2A}"/>
+              </a:ext>
+            </a:extLst>
+          </p:cNvPr>
+          <p:cNvCxnSpPr>
+            <a:cxnSpLocks/>
+          </p:cNvCxnSpPr>
+          <p:nvPr/>
+        </p:nvCxnSpPr>
+        <p:spPr>
+          <a:xfrm>
+            <a:off x="596419" y="1918576"/>
+            <a:ext cx="7955280" cy="0"/>
+          </a:xfrm>
+          <a:prstGeom prst="line">
+            <a:avLst/>
+          </a:prstGeom>
+          <a:ln w="28575">
+            <a:solidFill>
+              <a:schemeClr val="tx1"/>
+            </a:solidFill>
+          </a:ln>
+        </p:spPr>
+        <p:style>
+          <a:lnRef idx="1">
+            <a:schemeClr val="accent1"/>
+          </a:lnRef>
+          <a:fillRef idx="0">
+            <a:schemeClr val="accent1"/>
+          </a:fillRef>
+          <a:effectRef idx="0">
+            <a:schemeClr val="accent1"/>
+          </a:effectRef>
+          <a:fontRef idx="minor">
+            <a:schemeClr val="tx1"/>
+          </a:fontRef>
+        </p:style>
+      </p:cxnSp>
+      <p:cxnSp>
+        <p:nvCxnSpPr>
+          <p:cNvPr id="19" name="Straight Connector 18">
+            <a:extLst>
+              <a:ext uri="{FF2B5EF4-FFF2-40B4-BE49-F238E27FC236}">
+                <a16:creationId xmlns:a16="http://schemas.microsoft.com/office/drawing/2014/main" id="{92E4525B-64D5-4BC9-A9D4-BF68F2817BAC}"/>
+              </a:ext>
+            </a:extLst>
+          </p:cNvPr>
+          <p:cNvCxnSpPr>
+            <a:cxnSpLocks/>
+          </p:cNvCxnSpPr>
+          <p:nvPr/>
+        </p:nvCxnSpPr>
+        <p:spPr>
+          <a:xfrm>
+            <a:off x="596419" y="4525573"/>
+            <a:ext cx="2475866" cy="0"/>
+          </a:xfrm>
+          <a:prstGeom prst="line">
+            <a:avLst/>
+          </a:prstGeom>
+          <a:ln w="28575">
+            <a:solidFill>
+              <a:schemeClr val="tx1"/>
+            </a:solidFill>
+          </a:ln>
+        </p:spPr>
+        <p:style>
+          <a:lnRef idx="1">
+            <a:schemeClr val="accent1"/>
+          </a:lnRef>
+          <a:fillRef idx="0">
+            <a:schemeClr val="accent1"/>
+          </a:fillRef>
+          <a:effectRef idx="0">
+            <a:schemeClr val="accent1"/>
+          </a:effectRef>
+          <a:fontRef idx="minor">
+            <a:schemeClr val="tx1"/>
+          </a:fontRef>
+        </p:style>
+      </p:cxnSp>
+      <p:sp>
+        <p:nvSpPr>
+          <p:cNvPr id="25" name="Rectangle 24">
+            <a:extLst>
+              <a:ext uri="{FF2B5EF4-FFF2-40B4-BE49-F238E27FC236}">
+                <a16:creationId xmlns:a16="http://schemas.microsoft.com/office/drawing/2014/main" id="{F6A23CBC-B870-485C-B5F4-23C23D251F5F}"/>
               </a:ext>
             </a:extLst>
           </p:cNvPr>
@@ -6567,8 +7468,8 @@
         </p:nvSpPr>
         <p:spPr>
           <a:xfrm>
-            <a:off x="6542844" y="3425739"/>
-            <a:ext cx="2244570" cy="328472"/>
+            <a:off x="3357372" y="2149774"/>
+            <a:ext cx="2000332" cy="307134"/>
           </a:xfrm>
           <a:prstGeom prst="rect">
             <a:avLst/>
@@ -6598,58 +7499,67 @@
           <a:bodyPr rtlCol="0" anchor="t"/>
           <a:lstStyle/>
           <a:p>
-            <a:pPr algn="r"/>
-            <a:r>
-              <a:rPr lang="en-US" sz="1600" b="1" dirty="0">
+            <a:r>
+              <a:rPr lang="en-US" sz="1400" dirty="0">
                 <a:solidFill>
-                  <a:srgbClr val="0070C0"/>
+                  <a:schemeClr val="tx1"/>
                 </a:solidFill>
                 <a:latin typeface="Bahnschrift" panose="020B0502040204020203" pitchFamily="34" charset="0"/>
               </a:rPr>
-              <a:t>Target Variable </a:t>
-            </a:r>
-            <a:r>
-              <a:rPr lang="en-US" sz="1600" dirty="0">
-                <a:solidFill>
-                  <a:srgbClr val="0070C0"/>
-                </a:solidFill>
-                <a:latin typeface="Bahnschrift" panose="020B0502040204020203" pitchFamily="34" charset="0"/>
-              </a:rPr>
-              <a:t>Churn</a:t>
-            </a:r>
-          </a:p>
-          <a:p>
-            <a:pPr marL="285750" indent="-285750" algn="r">
-              <a:buFont typeface="Arial" panose="020B0604020202020204" pitchFamily="34" charset="0"/>
-              <a:buChar char="•"/>
-            </a:pPr>
-            <a:endParaRPr lang="en-US" sz="1600" dirty="0">
+              <a:t>Random Forest</a:t>
+            </a:r>
+          </a:p>
+          <a:p>
+            <a:endParaRPr lang="en-US" sz="1400" dirty="0">
               <a:solidFill>
-                <a:srgbClr val="0070C0"/>
+                <a:schemeClr val="tx1"/>
               </a:solidFill>
               <a:latin typeface="Bahnschrift" panose="020B0502040204020203" pitchFamily="34" charset="0"/>
             </a:endParaRPr>
           </a:p>
-          <a:p>
-            <a:pPr marL="285750" indent="-285750" algn="r">
-              <a:buFont typeface="Arial" panose="020B0604020202020204" pitchFamily="34" charset="0"/>
-              <a:buChar char="•"/>
-            </a:pPr>
-            <a:endParaRPr lang="en-US" sz="1200" dirty="0">
-              <a:solidFill>
-                <a:srgbClr val="0070C0"/>
-              </a:solidFill>
-              <a:latin typeface="Bahnschrift" panose="020B0502040204020203" pitchFamily="34" charset="0"/>
-            </a:endParaRPr>
-          </a:p>
-        </p:txBody>
-      </p:sp>
-      <p:sp>
-        <p:nvSpPr>
-          <p:cNvPr id="27" name="Rectangle 26">
+        </p:txBody>
+      </p:sp>
+      <p:pic>
+        <p:nvPicPr>
+          <p:cNvPr id="29" name="Picture 28">
             <a:extLst>
               <a:ext uri="{FF2B5EF4-FFF2-40B4-BE49-F238E27FC236}">
-                <a16:creationId xmlns:a16="http://schemas.microsoft.com/office/drawing/2014/main" id="{F7CFA3D8-6A6C-4687-B76A-9A1BF8E8C631}"/>
+                <a16:creationId xmlns:a16="http://schemas.microsoft.com/office/drawing/2014/main" id="{1D02B1AA-CD2A-49C6-94C7-6F9081E37A76}"/>
+              </a:ext>
+            </a:extLst>
+          </p:cNvPr>
+          <p:cNvPicPr>
+            <a:picLocks noChangeAspect="1"/>
+          </p:cNvPicPr>
+          <p:nvPr/>
+        </p:nvPicPr>
+        <p:blipFill rotWithShape="1">
+          <a:blip r:embed="rId2">
+            <a:extLst>
+              <a:ext uri="{28A0092B-C50C-407E-A947-70E740481C1C}">
+                <a14:useLocalDpi xmlns:a14="http://schemas.microsoft.com/office/drawing/2010/main" val="0"/>
+              </a:ext>
+            </a:extLst>
+          </a:blip>
+          <a:srcRect l="6838" b="9295"/>
+          <a:stretch/>
+        </p:blipFill>
+        <p:spPr>
+          <a:xfrm>
+            <a:off x="943665" y="2622308"/>
+            <a:ext cx="1852799" cy="1222979"/>
+          </a:xfrm>
+          <a:prstGeom prst="rect">
+            <a:avLst/>
+          </a:prstGeom>
+        </p:spPr>
+      </p:pic>
+      <p:sp>
+        <p:nvSpPr>
+          <p:cNvPr id="30" name="Rectangle 29">
+            <a:extLst>
+              <a:ext uri="{FF2B5EF4-FFF2-40B4-BE49-F238E27FC236}">
+                <a16:creationId xmlns:a16="http://schemas.microsoft.com/office/drawing/2014/main" id="{668FAF57-0C7A-477C-890E-27E2BBEC9D35}"/>
               </a:ext>
             </a:extLst>
           </p:cNvPr>
@@ -6658,8 +7568,8 @@
         </p:nvSpPr>
         <p:spPr>
           <a:xfrm>
-            <a:off x="338832" y="1642371"/>
-            <a:ext cx="8467817" cy="948865"/>
+            <a:off x="587253" y="2151154"/>
+            <a:ext cx="2130054" cy="307134"/>
           </a:xfrm>
           <a:prstGeom prst="rect">
             <a:avLst/>
@@ -6689,110 +7599,499 @@
           <a:bodyPr rtlCol="0" anchor="t"/>
           <a:lstStyle/>
           <a:p>
-            <a:pPr marL="285750" indent="-285750">
-              <a:buFont typeface="Arial" panose="020B0604020202020204" pitchFamily="34" charset="0"/>
-              <a:buChar char="•"/>
-            </a:pPr>
-            <a:r>
-              <a:rPr lang="en-US" sz="1600" dirty="0">
+            <a:r>
+              <a:rPr lang="en-US" sz="1400" dirty="0">
                 <a:solidFill>
                   <a:schemeClr val="tx1"/>
                 </a:solidFill>
                 <a:latin typeface="Bahnschrift" panose="020B0502040204020203" pitchFamily="34" charset="0"/>
               </a:rPr>
-              <a:t>Each row represents one customer</a:t>
-            </a:r>
-          </a:p>
-          <a:p>
-            <a:pPr marL="285750" indent="-285750">
-              <a:buFont typeface="Arial" panose="020B0604020202020204" pitchFamily="34" charset="0"/>
-              <a:buChar char="•"/>
-            </a:pPr>
-            <a:endParaRPr lang="en-US" sz="1600" dirty="0">
+              <a:t>Logistic Regression</a:t>
+            </a:r>
+          </a:p>
+          <a:p>
+            <a:endParaRPr lang="en-US" sz="1400" dirty="0">
               <a:solidFill>
                 <a:schemeClr val="tx1"/>
               </a:solidFill>
               <a:latin typeface="Bahnschrift" panose="020B0502040204020203" pitchFamily="34" charset="0"/>
             </a:endParaRPr>
           </a:p>
-          <a:p>
-            <a:pPr marL="285750" indent="-285750">
-              <a:buFont typeface="Arial" panose="020B0604020202020204" pitchFamily="34" charset="0"/>
-              <a:buChar char="•"/>
-            </a:pPr>
-            <a:r>
-              <a:rPr lang="en-US" sz="1600" dirty="0">
+        </p:txBody>
+      </p:sp>
+      <p:pic>
+        <p:nvPicPr>
+          <p:cNvPr id="34" name="Picture 33" descr="Graphical user interface, text, application, chat or text message&#10;&#10;Description automatically generated">
+            <a:extLst>
+              <a:ext uri="{FF2B5EF4-FFF2-40B4-BE49-F238E27FC236}">
+                <a16:creationId xmlns:a16="http://schemas.microsoft.com/office/drawing/2014/main" id="{19722BE4-2F86-4D4C-B20D-AE505B01E015}"/>
+              </a:ext>
+            </a:extLst>
+          </p:cNvPr>
+          <p:cNvPicPr>
+            <a:picLocks noChangeAspect="1"/>
+          </p:cNvPicPr>
+          <p:nvPr/>
+        </p:nvPicPr>
+        <p:blipFill>
+          <a:blip r:embed="rId3">
+            <a:extLst>
+              <a:ext uri="{28A0092B-C50C-407E-A947-70E740481C1C}">
+                <a14:useLocalDpi xmlns:a14="http://schemas.microsoft.com/office/drawing/2010/main" val="0"/>
+              </a:ext>
+            </a:extLst>
+          </a:blip>
+          <a:stretch>
+            <a:fillRect/>
+          </a:stretch>
+        </p:blipFill>
+        <p:spPr>
+          <a:xfrm>
+            <a:off x="6216165" y="2751796"/>
+            <a:ext cx="2178194" cy="956493"/>
+          </a:xfrm>
+          <a:prstGeom prst="rect">
+            <a:avLst/>
+          </a:prstGeom>
+        </p:spPr>
+      </p:pic>
+      <p:sp>
+        <p:nvSpPr>
+          <p:cNvPr id="35" name="Rectangle 34">
+            <a:extLst>
+              <a:ext uri="{FF2B5EF4-FFF2-40B4-BE49-F238E27FC236}">
+                <a16:creationId xmlns:a16="http://schemas.microsoft.com/office/drawing/2014/main" id="{6F9B13C0-79F1-4EEC-BFD1-3F9545E3FBE1}"/>
+              </a:ext>
+            </a:extLst>
+          </p:cNvPr>
+          <p:cNvSpPr/>
+          <p:nvPr/>
+        </p:nvSpPr>
+        <p:spPr>
+          <a:xfrm>
+            <a:off x="6070822" y="2149774"/>
+            <a:ext cx="2000332" cy="307134"/>
+          </a:xfrm>
+          <a:prstGeom prst="rect">
+            <a:avLst/>
+          </a:prstGeom>
+          <a:noFill/>
+          <a:ln>
+            <a:noFill/>
+          </a:ln>
+        </p:spPr>
+        <p:style>
+          <a:lnRef idx="2">
+            <a:schemeClr val="accent1">
+              <a:shade val="50000"/>
+            </a:schemeClr>
+          </a:lnRef>
+          <a:fillRef idx="1">
+            <a:schemeClr val="accent1"/>
+          </a:fillRef>
+          <a:effectRef idx="0">
+            <a:schemeClr val="accent1"/>
+          </a:effectRef>
+          <a:fontRef idx="minor">
+            <a:schemeClr val="lt1"/>
+          </a:fontRef>
+        </p:style>
+        <p:txBody>
+          <a:bodyPr rtlCol="0" anchor="t"/>
+          <a:lstStyle/>
+          <a:p>
+            <a:r>
+              <a:rPr lang="en-US" sz="1400" dirty="0">
                 <a:solidFill>
                   <a:schemeClr val="tx1"/>
                 </a:solidFill>
                 <a:latin typeface="Bahnschrift" panose="020B0502040204020203" pitchFamily="34" charset="0"/>
               </a:rPr>
-              <a:t>The </a:t>
-            </a:r>
-            <a:r>
-              <a:rPr lang="en-US" sz="1600" b="1" dirty="0">
-                <a:solidFill>
-                  <a:srgbClr val="00B050"/>
-                </a:solidFill>
-                <a:latin typeface="Bahnschrift" panose="020B0502040204020203" pitchFamily="34" charset="0"/>
-              </a:rPr>
-              <a:t>Feature Variables </a:t>
-            </a:r>
-            <a:r>
-              <a:rPr lang="en-US" sz="1600" dirty="0">
+              <a:t>Ensemble Model</a:t>
+            </a:r>
+          </a:p>
+          <a:p>
+            <a:endParaRPr lang="en-US" sz="1400" dirty="0">
+              <a:solidFill>
+                <a:schemeClr val="tx1"/>
+              </a:solidFill>
+              <a:latin typeface="Bahnschrift" panose="020B0502040204020203" pitchFamily="34" charset="0"/>
+            </a:endParaRPr>
+          </a:p>
+        </p:txBody>
+      </p:sp>
+      <p:pic>
+        <p:nvPicPr>
+          <p:cNvPr id="42" name="Picture 41">
+            <a:extLst>
+              <a:ext uri="{FF2B5EF4-FFF2-40B4-BE49-F238E27FC236}">
+                <a16:creationId xmlns:a16="http://schemas.microsoft.com/office/drawing/2014/main" id="{7C85AD99-4D43-4315-AF6E-E5ED1B8295D0}"/>
+              </a:ext>
+            </a:extLst>
+          </p:cNvPr>
+          <p:cNvPicPr>
+            <a:picLocks noChangeAspect="1"/>
+          </p:cNvPicPr>
+          <p:nvPr/>
+        </p:nvPicPr>
+        <p:blipFill>
+          <a:blip r:embed="rId4">
+            <a:extLst>
+              <a:ext uri="{28A0092B-C50C-407E-A947-70E740481C1C}">
+                <a14:useLocalDpi xmlns:a14="http://schemas.microsoft.com/office/drawing/2010/main" val="0"/>
+              </a:ext>
+            </a:extLst>
+          </a:blip>
+          <a:stretch>
+            <a:fillRect/>
+          </a:stretch>
+        </p:blipFill>
+        <p:spPr>
+          <a:xfrm>
+            <a:off x="3572229" y="2647075"/>
+            <a:ext cx="2000332" cy="1157159"/>
+          </a:xfrm>
+          <a:prstGeom prst="rect">
+            <a:avLst/>
+          </a:prstGeom>
+        </p:spPr>
+      </p:pic>
+      <p:sp>
+        <p:nvSpPr>
+          <p:cNvPr id="44" name="Rectangle 43">
+            <a:extLst>
+              <a:ext uri="{FF2B5EF4-FFF2-40B4-BE49-F238E27FC236}">
+                <a16:creationId xmlns:a16="http://schemas.microsoft.com/office/drawing/2014/main" id="{62C039DB-EB56-4AF0-A829-4E844A1F689E}"/>
+              </a:ext>
+            </a:extLst>
+          </p:cNvPr>
+          <p:cNvSpPr/>
+          <p:nvPr/>
+        </p:nvSpPr>
+        <p:spPr>
+          <a:xfrm>
+            <a:off x="587253" y="4743622"/>
+            <a:ext cx="2468880" cy="1862668"/>
+          </a:xfrm>
+          <a:prstGeom prst="rect">
+            <a:avLst/>
+          </a:prstGeom>
+          <a:solidFill>
+            <a:schemeClr val="accent4">
+              <a:lumMod val="20000"/>
+              <a:lumOff val="80000"/>
+            </a:schemeClr>
+          </a:solidFill>
+          <a:ln>
+            <a:noFill/>
+          </a:ln>
+        </p:spPr>
+        <p:style>
+          <a:lnRef idx="2">
+            <a:schemeClr val="accent1">
+              <a:shade val="50000"/>
+            </a:schemeClr>
+          </a:lnRef>
+          <a:fillRef idx="1">
+            <a:schemeClr val="accent1"/>
+          </a:fillRef>
+          <a:effectRef idx="0">
+            <a:schemeClr val="accent1"/>
+          </a:effectRef>
+          <a:fontRef idx="minor">
+            <a:schemeClr val="lt1"/>
+          </a:fontRef>
+        </p:style>
+        <p:txBody>
+          <a:bodyPr rtlCol="0" anchor="ctr"/>
+          <a:lstStyle/>
+          <a:p>
+            <a:pPr algn="ctr"/>
+            <a:endParaRPr lang="en-US"/>
+          </a:p>
+        </p:txBody>
+      </p:sp>
+      <p:pic>
+        <p:nvPicPr>
+          <p:cNvPr id="46" name="Picture 45" descr="A picture containing blur&#10;&#10;Description automatically generated">
+            <a:extLst>
+              <a:ext uri="{FF2B5EF4-FFF2-40B4-BE49-F238E27FC236}">
+                <a16:creationId xmlns:a16="http://schemas.microsoft.com/office/drawing/2014/main" id="{8235D6D9-12A5-4DD7-9D56-C9DDAEDADB33}"/>
+              </a:ext>
+            </a:extLst>
+          </p:cNvPr>
+          <p:cNvPicPr>
+            <a:picLocks noChangeAspect="1"/>
+          </p:cNvPicPr>
+          <p:nvPr/>
+        </p:nvPicPr>
+        <p:blipFill>
+          <a:blip r:embed="rId5">
+            <a:extLst>
+              <a:ext uri="{28A0092B-C50C-407E-A947-70E740481C1C}">
+                <a14:useLocalDpi xmlns:a14="http://schemas.microsoft.com/office/drawing/2010/main" val="0"/>
+              </a:ext>
+            </a:extLst>
+          </a:blip>
+          <a:stretch>
+            <a:fillRect/>
+          </a:stretch>
+        </p:blipFill>
+        <p:spPr>
+          <a:xfrm>
+            <a:off x="838885" y="5162430"/>
+            <a:ext cx="1957579" cy="1223488"/>
+          </a:xfrm>
+          <a:prstGeom prst="rect">
+            <a:avLst/>
+          </a:prstGeom>
+        </p:spPr>
+      </p:pic>
+      <p:sp>
+        <p:nvSpPr>
+          <p:cNvPr id="47" name="Rectangle 46">
+            <a:extLst>
+              <a:ext uri="{FF2B5EF4-FFF2-40B4-BE49-F238E27FC236}">
+                <a16:creationId xmlns:a16="http://schemas.microsoft.com/office/drawing/2014/main" id="{6731FC48-7EEB-4988-B8F5-6C17B4379D05}"/>
+              </a:ext>
+            </a:extLst>
+          </p:cNvPr>
+          <p:cNvSpPr/>
+          <p:nvPr/>
+        </p:nvSpPr>
+        <p:spPr>
+          <a:xfrm>
+            <a:off x="587253" y="4751316"/>
+            <a:ext cx="2468880" cy="307134"/>
+          </a:xfrm>
+          <a:prstGeom prst="rect">
+            <a:avLst/>
+          </a:prstGeom>
+          <a:noFill/>
+          <a:ln>
+            <a:noFill/>
+          </a:ln>
+        </p:spPr>
+        <p:style>
+          <a:lnRef idx="2">
+            <a:schemeClr val="accent1">
+              <a:shade val="50000"/>
+            </a:schemeClr>
+          </a:lnRef>
+          <a:fillRef idx="1">
+            <a:schemeClr val="accent1"/>
+          </a:fillRef>
+          <a:effectRef idx="0">
+            <a:schemeClr val="accent1"/>
+          </a:effectRef>
+          <a:fontRef idx="minor">
+            <a:schemeClr val="lt1"/>
+          </a:fontRef>
+        </p:style>
+        <p:txBody>
+          <a:bodyPr rtlCol="0" anchor="t"/>
+          <a:lstStyle/>
+          <a:p>
+            <a:r>
+              <a:rPr lang="sv-SE" sz="1400" dirty="0">
                 <a:solidFill>
                   <a:schemeClr val="tx1"/>
                 </a:solidFill>
                 <a:latin typeface="Bahnschrift" panose="020B0502040204020203" pitchFamily="34" charset="0"/>
               </a:rPr>
-              <a:t>contains both categorical and continuous data</a:t>
-            </a:r>
-          </a:p>
-          <a:p>
-            <a:pPr marL="285750" indent="-285750">
-              <a:buFont typeface="Arial" panose="020B0604020202020204" pitchFamily="34" charset="0"/>
-              <a:buChar char="•"/>
-            </a:pPr>
-            <a:endParaRPr lang="en-US" sz="1600" dirty="0">
+              <a:t>Neural Net Classification</a:t>
+            </a:r>
+            <a:endParaRPr lang="en-US" sz="1400" dirty="0">
               <a:solidFill>
                 <a:schemeClr val="tx1"/>
               </a:solidFill>
               <a:latin typeface="Bahnschrift" panose="020B0502040204020203" pitchFamily="34" charset="0"/>
             </a:endParaRPr>
           </a:p>
-          <a:p>
-            <a:pPr marL="285750" indent="-285750">
-              <a:buClr>
-                <a:schemeClr val="tx1"/>
-              </a:buClr>
-              <a:buFont typeface="Arial" panose="020B0604020202020204" pitchFamily="34" charset="0"/>
-              <a:buChar char="•"/>
-            </a:pPr>
-            <a:r>
-              <a:rPr lang="en-US" sz="1600" b="1" dirty="0">
-                <a:solidFill>
-                  <a:srgbClr val="0070C0"/>
-                </a:solidFill>
-                <a:latin typeface="Bahnschrift" panose="020B0502040204020203" pitchFamily="34" charset="0"/>
-              </a:rPr>
-              <a:t>Target Variable </a:t>
-            </a:r>
-            <a:r>
-              <a:rPr lang="en-US" sz="1600" dirty="0">
+        </p:txBody>
+      </p:sp>
+      <p:sp>
+        <p:nvSpPr>
+          <p:cNvPr id="52" name="Rectangle 51">
+            <a:extLst>
+              <a:ext uri="{FF2B5EF4-FFF2-40B4-BE49-F238E27FC236}">
+                <a16:creationId xmlns:a16="http://schemas.microsoft.com/office/drawing/2014/main" id="{921410C8-15A7-4224-8F4A-B240DD02414E}"/>
+              </a:ext>
+            </a:extLst>
+          </p:cNvPr>
+          <p:cNvSpPr/>
+          <p:nvPr/>
+        </p:nvSpPr>
+        <p:spPr>
+          <a:xfrm>
+            <a:off x="3237388" y="4134729"/>
+            <a:ext cx="4771623" cy="376262"/>
+          </a:xfrm>
+          <a:prstGeom prst="rect">
+            <a:avLst/>
+          </a:prstGeom>
+          <a:noFill/>
+          <a:ln>
+            <a:noFill/>
+          </a:ln>
+        </p:spPr>
+        <p:style>
+          <a:lnRef idx="2">
+            <a:schemeClr val="accent1">
+              <a:shade val="50000"/>
+            </a:schemeClr>
+          </a:lnRef>
+          <a:fillRef idx="1">
+            <a:schemeClr val="accent1"/>
+          </a:fillRef>
+          <a:effectRef idx="0">
+            <a:schemeClr val="accent1"/>
+          </a:effectRef>
+          <a:fontRef idx="minor">
+            <a:schemeClr val="lt1"/>
+          </a:fontRef>
+        </p:style>
+        <p:txBody>
+          <a:bodyPr rtlCol="0" anchor="t"/>
+          <a:lstStyle/>
+          <a:p>
+            <a:r>
+              <a:rPr lang="en-US" b="1" dirty="0">
                 <a:solidFill>
                   <a:schemeClr val="tx1"/>
                 </a:solidFill>
                 <a:latin typeface="Bahnschrift" panose="020B0502040204020203" pitchFamily="34" charset="0"/>
               </a:rPr>
-              <a:t>is binary (Yes / No)</a:t>
-            </a:r>
-          </a:p>
-        </p:txBody>
-      </p:sp>
+              <a:t>Step 3: Assess, Select &amp; Save</a:t>
+            </a:r>
+            <a:endParaRPr lang="en-US" sz="1200" b="1" dirty="0">
+              <a:solidFill>
+                <a:schemeClr val="tx1"/>
+              </a:solidFill>
+              <a:latin typeface="Bahnschrift" panose="020B0502040204020203" pitchFamily="34" charset="0"/>
+            </a:endParaRPr>
+          </a:p>
+        </p:txBody>
+      </p:sp>
+      <p:cxnSp>
+        <p:nvCxnSpPr>
+          <p:cNvPr id="53" name="Straight Connector 52">
+            <a:extLst>
+              <a:ext uri="{FF2B5EF4-FFF2-40B4-BE49-F238E27FC236}">
+                <a16:creationId xmlns:a16="http://schemas.microsoft.com/office/drawing/2014/main" id="{8D230988-F8DF-4029-9423-6FE2CC20E60A}"/>
+              </a:ext>
+            </a:extLst>
+          </p:cNvPr>
+          <p:cNvCxnSpPr>
+            <a:cxnSpLocks/>
+          </p:cNvCxnSpPr>
+          <p:nvPr/>
+        </p:nvCxnSpPr>
+        <p:spPr>
+          <a:xfrm>
+            <a:off x="3326244" y="4525573"/>
+            <a:ext cx="5225455" cy="0"/>
+          </a:xfrm>
+          <a:prstGeom prst="line">
+            <a:avLst/>
+          </a:prstGeom>
+          <a:ln w="28575">
+            <a:solidFill>
+              <a:schemeClr val="tx1"/>
+            </a:solidFill>
+          </a:ln>
+        </p:spPr>
+        <p:style>
+          <a:lnRef idx="1">
+            <a:schemeClr val="accent1"/>
+          </a:lnRef>
+          <a:fillRef idx="0">
+            <a:schemeClr val="accent1"/>
+          </a:fillRef>
+          <a:effectRef idx="0">
+            <a:schemeClr val="accent1"/>
+          </a:effectRef>
+          <a:fontRef idx="minor">
+            <a:schemeClr val="tx1"/>
+          </a:fontRef>
+        </p:style>
+      </p:cxnSp>
+      <p:pic>
+        <p:nvPicPr>
+          <p:cNvPr id="58" name="Picture 57" descr="Chart, line chart&#10;&#10;Description automatically generated">
+            <a:extLst>
+              <a:ext uri="{FF2B5EF4-FFF2-40B4-BE49-F238E27FC236}">
+                <a16:creationId xmlns:a16="http://schemas.microsoft.com/office/drawing/2014/main" id="{D7862FD2-6D86-489D-BF02-65FAA74021A7}"/>
+              </a:ext>
+            </a:extLst>
+          </p:cNvPr>
+          <p:cNvPicPr>
+            <a:picLocks noChangeAspect="1"/>
+          </p:cNvPicPr>
+          <p:nvPr/>
+        </p:nvPicPr>
+        <p:blipFill>
+          <a:blip r:embed="rId6">
+            <a:extLst>
+              <a:ext uri="{28A0092B-C50C-407E-A947-70E740481C1C}">
+                <a14:useLocalDpi xmlns:a14="http://schemas.microsoft.com/office/drawing/2010/main" val="0"/>
+              </a:ext>
+            </a:extLst>
+          </a:blip>
+          <a:stretch>
+            <a:fillRect/>
+          </a:stretch>
+        </p:blipFill>
+        <p:spPr>
+          <a:xfrm>
+            <a:off x="3572229" y="5002472"/>
+            <a:ext cx="2273871" cy="1543404"/>
+          </a:xfrm>
+          <a:prstGeom prst="rect">
+            <a:avLst/>
+          </a:prstGeom>
+        </p:spPr>
+      </p:pic>
+      <p:pic>
+        <p:nvPicPr>
+          <p:cNvPr id="60" name="Picture 59" descr="A picture containing line chart&#10;&#10;Description automatically generated">
+            <a:extLst>
+              <a:ext uri="{FF2B5EF4-FFF2-40B4-BE49-F238E27FC236}">
+                <a16:creationId xmlns:a16="http://schemas.microsoft.com/office/drawing/2014/main" id="{71F23C95-8109-413D-AA0C-158D8A8CA18F}"/>
+              </a:ext>
+            </a:extLst>
+          </p:cNvPr>
+          <p:cNvPicPr>
+            <a:picLocks noChangeAspect="1"/>
+          </p:cNvPicPr>
+          <p:nvPr/>
+        </p:nvPicPr>
+        <p:blipFill>
+          <a:blip r:embed="rId7">
+            <a:extLst>
+              <a:ext uri="{28A0092B-C50C-407E-A947-70E740481C1C}">
+                <a14:useLocalDpi xmlns:a14="http://schemas.microsoft.com/office/drawing/2010/main" val="0"/>
+              </a:ext>
+            </a:extLst>
+          </a:blip>
+          <a:stretch>
+            <a:fillRect/>
+          </a:stretch>
+        </p:blipFill>
+        <p:spPr>
+          <a:xfrm>
+            <a:off x="6081113" y="5002472"/>
+            <a:ext cx="2273870" cy="1543404"/>
+          </a:xfrm>
+          <a:prstGeom prst="rect">
+            <a:avLst/>
+          </a:prstGeom>
+        </p:spPr>
+      </p:pic>
     </p:spTree>
     <p:extLst>
       <p:ext uri="{BB962C8B-B14F-4D97-AF65-F5344CB8AC3E}">
-        <p14:creationId xmlns:p14="http://schemas.microsoft.com/office/powerpoint/2010/main" val="2799488744"/>
+        <p14:creationId xmlns:p14="http://schemas.microsoft.com/office/powerpoint/2010/main" val="1054600485"/>
       </p:ext>
     </p:extLst>
   </p:cSld>
@@ -7273,4 +8572,299 @@
     </a:ext>
   </a:extLst>
 </a:theme>
+</file>
+
+<file path=ppt/theme/theme2.xml><?xml version="1.0" encoding="utf-8"?>
+<a:theme xmlns:a="http://schemas.openxmlformats.org/drawingml/2006/main" name="Office Theme">
+  <a:themeElements>
+    <a:clrScheme name="Office">
+      <a:dk1>
+        <a:sysClr val="windowText" lastClr="000000"/>
+      </a:dk1>
+      <a:lt1>
+        <a:sysClr val="window" lastClr="FFFFFF"/>
+      </a:lt1>
+      <a:dk2>
+        <a:srgbClr val="44546A"/>
+      </a:dk2>
+      <a:lt2>
+        <a:srgbClr val="E7E6E6"/>
+      </a:lt2>
+      <a:accent1>
+        <a:srgbClr val="4472C4"/>
+      </a:accent1>
+      <a:accent2>
+        <a:srgbClr val="ED7D31"/>
+      </a:accent2>
+      <a:accent3>
+        <a:srgbClr val="A5A5A5"/>
+      </a:accent3>
+      <a:accent4>
+        <a:srgbClr val="FFC000"/>
+      </a:accent4>
+      <a:accent5>
+        <a:srgbClr val="5B9BD5"/>
+      </a:accent5>
+      <a:accent6>
+        <a:srgbClr val="70AD47"/>
+      </a:accent6>
+      <a:hlink>
+        <a:srgbClr val="0563C1"/>
+      </a:hlink>
+      <a:folHlink>
+        <a:srgbClr val="954F72"/>
+      </a:folHlink>
+    </a:clrScheme>
+    <a:fontScheme name="Office">
+      <a:majorFont>
+        <a:latin typeface="Calibri Light" panose="020F0302020204030204"/>
+        <a:ea typeface=""/>
+        <a:cs typeface=""/>
+        <a:font script="Jpan" typeface="游ゴシック Light"/>
+        <a:font script="Hang" typeface="맑은 고딕"/>
+        <a:font script="Hans" typeface="等线 Light"/>
+        <a:font script="Hant" typeface="新細明體"/>
+        <a:font script="Arab" typeface="Times New Roman"/>
+        <a:font script="Hebr" typeface="Times New Roman"/>
+        <a:font script="Thai" typeface="Angsana New"/>
+        <a:font script="Ethi" typeface="Nyala"/>
+        <a:font script="Beng" typeface="Vrinda"/>
+        <a:font script="Gujr" typeface="Shruti"/>
+        <a:font script="Khmr" typeface="MoolBoran"/>
+        <a:font script="Knda" typeface="Tunga"/>
+        <a:font script="Guru" typeface="Raavi"/>
+        <a:font script="Cans" typeface="Euphemia"/>
+        <a:font script="Cher" typeface="Plantagenet Cherokee"/>
+        <a:font script="Yiii" typeface="Microsoft Yi Baiti"/>
+        <a:font script="Tibt" typeface="Microsoft Himalaya"/>
+        <a:font script="Thaa" typeface="MV Boli"/>
+        <a:font script="Deva" typeface="Mangal"/>
+        <a:font script="Telu" typeface="Gautami"/>
+        <a:font script="Taml" typeface="Latha"/>
+        <a:font script="Syrc" typeface="Estrangelo Edessa"/>
+        <a:font script="Orya" typeface="Kalinga"/>
+        <a:font script="Mlym" typeface="Kartika"/>
+        <a:font script="Laoo" typeface="DokChampa"/>
+        <a:font script="Sinh" typeface="Iskoola Pota"/>
+        <a:font script="Mong" typeface="Mongolian Baiti"/>
+        <a:font script="Viet" typeface="Times New Roman"/>
+        <a:font script="Uigh" typeface="Microsoft Uighur"/>
+        <a:font script="Geor" typeface="Sylfaen"/>
+        <a:font script="Armn" typeface="Arial"/>
+        <a:font script="Bugi" typeface="Leelawadee UI"/>
+        <a:font script="Bopo" typeface="Microsoft JhengHei"/>
+        <a:font script="Java" typeface="Javanese Text"/>
+        <a:font script="Lisu" typeface="Segoe UI"/>
+        <a:font script="Mymr" typeface="Myanmar Text"/>
+        <a:font script="Nkoo" typeface="Ebrima"/>
+        <a:font script="Olck" typeface="Nirmala UI"/>
+        <a:font script="Osma" typeface="Ebrima"/>
+        <a:font script="Phag" typeface="Phagspa"/>
+        <a:font script="Syrn" typeface="Estrangelo Edessa"/>
+        <a:font script="Syrj" typeface="Estrangelo Edessa"/>
+        <a:font script="Syre" typeface="Estrangelo Edessa"/>
+        <a:font script="Sora" typeface="Nirmala UI"/>
+        <a:font script="Tale" typeface="Microsoft Tai Le"/>
+        <a:font script="Talu" typeface="Microsoft New Tai Lue"/>
+        <a:font script="Tfng" typeface="Ebrima"/>
+      </a:majorFont>
+      <a:minorFont>
+        <a:latin typeface="Calibri" panose="020F0502020204030204"/>
+        <a:ea typeface=""/>
+        <a:cs typeface=""/>
+        <a:font script="Jpan" typeface="游ゴシック"/>
+        <a:font script="Hang" typeface="맑은 고딕"/>
+        <a:font script="Hans" typeface="等线"/>
+        <a:font script="Hant" typeface="新細明體"/>
+        <a:font script="Arab" typeface="Arial"/>
+        <a:font script="Hebr" typeface="Arial"/>
+        <a:font script="Thai" typeface="Cordia New"/>
+        <a:font script="Ethi" typeface="Nyala"/>
+        <a:font script="Beng" typeface="Vrinda"/>
+        <a:font script="Gujr" typeface="Shruti"/>
+        <a:font script="Khmr" typeface="DaunPenh"/>
+        <a:font script="Knda" typeface="Tunga"/>
+        <a:font script="Guru" typeface="Raavi"/>
+        <a:font script="Cans" typeface="Euphemia"/>
+        <a:font script="Cher" typeface="Plantagenet Cherokee"/>
+        <a:font script="Yiii" typeface="Microsoft Yi Baiti"/>
+        <a:font script="Tibt" typeface="Microsoft Himalaya"/>
+        <a:font script="Thaa" typeface="MV Boli"/>
+        <a:font script="Deva" typeface="Mangal"/>
+        <a:font script="Telu" typeface="Gautami"/>
+        <a:font script="Taml" typeface="Latha"/>
+        <a:font script="Syrc" typeface="Estrangelo Edessa"/>
+        <a:font script="Orya" typeface="Kalinga"/>
+        <a:font script="Mlym" typeface="Kartika"/>
+        <a:font script="Laoo" typeface="DokChampa"/>
+        <a:font script="Sinh" typeface="Iskoola Pota"/>
+        <a:font script="Mong" typeface="Mongolian Baiti"/>
+        <a:font script="Viet" typeface="Arial"/>
+        <a:font script="Uigh" typeface="Microsoft Uighur"/>
+        <a:font script="Geor" typeface="Sylfaen"/>
+        <a:font script="Armn" typeface="Arial"/>
+        <a:font script="Bugi" typeface="Leelawadee UI"/>
+        <a:font script="Bopo" typeface="Microsoft JhengHei"/>
+        <a:font script="Java" typeface="Javanese Text"/>
+        <a:font script="Lisu" typeface="Segoe UI"/>
+        <a:font script="Mymr" typeface="Myanmar Text"/>
+        <a:font script="Nkoo" typeface="Ebrima"/>
+        <a:font script="Olck" typeface="Nirmala UI"/>
+        <a:font script="Osma" typeface="Ebrima"/>
+        <a:font script="Phag" typeface="Phagspa"/>
+        <a:font script="Syrn" typeface="Estrangelo Edessa"/>
+        <a:font script="Syrj" typeface="Estrangelo Edessa"/>
+        <a:font script="Syre" typeface="Estrangelo Edessa"/>
+        <a:font script="Sora" typeface="Nirmala UI"/>
+        <a:font script="Tale" typeface="Microsoft Tai Le"/>
+        <a:font script="Talu" typeface="Microsoft New Tai Lue"/>
+        <a:font script="Tfng" typeface="Ebrima"/>
+      </a:minorFont>
+    </a:fontScheme>
+    <a:fmtScheme name="Office">
+      <a:fillStyleLst>
+        <a:solidFill>
+          <a:schemeClr val="phClr"/>
+        </a:solidFill>
+        <a:gradFill rotWithShape="1">
+          <a:gsLst>
+            <a:gs pos="0">
+              <a:schemeClr val="phClr">
+                <a:lumMod val="110000"/>
+                <a:satMod val="105000"/>
+                <a:tint val="67000"/>
+              </a:schemeClr>
+            </a:gs>
+            <a:gs pos="50000">
+              <a:schemeClr val="phClr">
+                <a:lumMod val="105000"/>
+                <a:satMod val="103000"/>
+                <a:tint val="73000"/>
+              </a:schemeClr>
+            </a:gs>
+            <a:gs pos="100000">
+              <a:schemeClr val="phClr">
+                <a:lumMod val="105000"/>
+                <a:satMod val="109000"/>
+                <a:tint val="81000"/>
+              </a:schemeClr>
+            </a:gs>
+          </a:gsLst>
+          <a:lin ang="5400000" scaled="0"/>
+        </a:gradFill>
+        <a:gradFill rotWithShape="1">
+          <a:gsLst>
+            <a:gs pos="0">
+              <a:schemeClr val="phClr">
+                <a:satMod val="103000"/>
+                <a:lumMod val="102000"/>
+                <a:tint val="94000"/>
+              </a:schemeClr>
+            </a:gs>
+            <a:gs pos="50000">
+              <a:schemeClr val="phClr">
+                <a:satMod val="110000"/>
+                <a:lumMod val="100000"/>
+                <a:shade val="100000"/>
+              </a:schemeClr>
+            </a:gs>
+            <a:gs pos="100000">
+              <a:schemeClr val="phClr">
+                <a:lumMod val="99000"/>
+                <a:satMod val="120000"/>
+                <a:shade val="78000"/>
+              </a:schemeClr>
+            </a:gs>
+          </a:gsLst>
+          <a:lin ang="5400000" scaled="0"/>
+        </a:gradFill>
+      </a:fillStyleLst>
+      <a:lnStyleLst>
+        <a:ln w="6350" cap="flat" cmpd="sng" algn="ctr">
+          <a:solidFill>
+            <a:schemeClr val="phClr"/>
+          </a:solidFill>
+          <a:prstDash val="solid"/>
+          <a:miter lim="800000"/>
+        </a:ln>
+        <a:ln w="12700" cap="flat" cmpd="sng" algn="ctr">
+          <a:solidFill>
+            <a:schemeClr val="phClr"/>
+          </a:solidFill>
+          <a:prstDash val="solid"/>
+          <a:miter lim="800000"/>
+        </a:ln>
+        <a:ln w="19050" cap="flat" cmpd="sng" algn="ctr">
+          <a:solidFill>
+            <a:schemeClr val="phClr"/>
+          </a:solidFill>
+          <a:prstDash val="solid"/>
+          <a:miter lim="800000"/>
+        </a:ln>
+      </a:lnStyleLst>
+      <a:effectStyleLst>
+        <a:effectStyle>
+          <a:effectLst/>
+        </a:effectStyle>
+        <a:effectStyle>
+          <a:effectLst/>
+        </a:effectStyle>
+        <a:effectStyle>
+          <a:effectLst>
+            <a:outerShdw blurRad="57150" dist="19050" dir="5400000" algn="ctr" rotWithShape="0">
+              <a:srgbClr val="000000">
+                <a:alpha val="63000"/>
+              </a:srgbClr>
+            </a:outerShdw>
+          </a:effectLst>
+        </a:effectStyle>
+      </a:effectStyleLst>
+      <a:bgFillStyleLst>
+        <a:solidFill>
+          <a:schemeClr val="phClr"/>
+        </a:solidFill>
+        <a:solidFill>
+          <a:schemeClr val="phClr">
+            <a:tint val="95000"/>
+            <a:satMod val="170000"/>
+          </a:schemeClr>
+        </a:solidFill>
+        <a:gradFill rotWithShape="1">
+          <a:gsLst>
+            <a:gs pos="0">
+              <a:schemeClr val="phClr">
+                <a:tint val="93000"/>
+                <a:satMod val="150000"/>
+                <a:shade val="98000"/>
+                <a:lumMod val="102000"/>
+              </a:schemeClr>
+            </a:gs>
+            <a:gs pos="50000">
+              <a:schemeClr val="phClr">
+                <a:tint val="98000"/>
+                <a:satMod val="130000"/>
+                <a:shade val="90000"/>
+                <a:lumMod val="103000"/>
+              </a:schemeClr>
+            </a:gs>
+            <a:gs pos="100000">
+              <a:schemeClr val="phClr">
+                <a:shade val="63000"/>
+                <a:satMod val="120000"/>
+              </a:schemeClr>
+            </a:gs>
+          </a:gsLst>
+          <a:lin ang="5400000" scaled="0"/>
+        </a:gradFill>
+      </a:bgFillStyleLst>
+    </a:fmtScheme>
+  </a:themeElements>
+  <a:objectDefaults/>
+  <a:extraClrSchemeLst/>
+  <a:extLst>
+    <a:ext uri="{05A4C25C-085E-4340-85A3-A5531E510DB2}">
+      <thm15:themeFamily xmlns:thm15="http://schemas.microsoft.com/office/thememl/2012/main" name="Office Theme" id="{62F939B6-93AF-4DB8-9C6B-D6C7DFDC589F}" vid="{4A3C46E8-61CC-4603-A589-7422A47A8E4A}"/>
+    </a:ext>
+  </a:extLst>
+</a:theme>
 </file>
</xml_diff>